<commit_message>
Updates and edits to improve notebook and slides
</commit_message>
<xml_diff>
--- a/NLP Project Slides.pptx
+++ b/NLP Project Slides.pptx
@@ -139,18 +139,18 @@
   <pc:docChgLst>
     <pc:chgData name="Joshua Ho" userId="f21a5117-53dc-4271-a79b-0a4f548af6e1" providerId="ADAL" clId="{30F5B7B2-929C-4119-8584-3764F0694251}"/>
     <pc:docChg chg="undo custSel addSld delSld modSld sldOrd">
-      <pc:chgData name="Joshua Ho" userId="f21a5117-53dc-4271-a79b-0a4f548af6e1" providerId="ADAL" clId="{30F5B7B2-929C-4119-8584-3764F0694251}" dt="2023-01-03T04:13:56.065" v="3753" actId="20577"/>
+      <pc:chgData name="Joshua Ho" userId="f21a5117-53dc-4271-a79b-0a4f548af6e1" providerId="ADAL" clId="{30F5B7B2-929C-4119-8584-3764F0694251}" dt="2023-01-03T18:04:06.794" v="4847" actId="113"/>
       <pc:docMkLst>
         <pc:docMk/>
       </pc:docMkLst>
       <pc:sldChg chg="addSp delSp modSp mod">
-        <pc:chgData name="Joshua Ho" userId="f21a5117-53dc-4271-a79b-0a4f548af6e1" providerId="ADAL" clId="{30F5B7B2-929C-4119-8584-3764F0694251}" dt="2023-01-03T04:13:56.065" v="3753" actId="20577"/>
+        <pc:chgData name="Joshua Ho" userId="f21a5117-53dc-4271-a79b-0a4f548af6e1" providerId="ADAL" clId="{30F5B7B2-929C-4119-8584-3764F0694251}" dt="2023-01-03T16:52:28.492" v="3801" actId="27636"/>
         <pc:sldMkLst>
           <pc:docMk/>
           <pc:sldMk cId="3263097216" sldId="256"/>
         </pc:sldMkLst>
         <pc:spChg chg="mod">
-          <ac:chgData name="Joshua Ho" userId="f21a5117-53dc-4271-a79b-0a4f548af6e1" providerId="ADAL" clId="{30F5B7B2-929C-4119-8584-3764F0694251}" dt="2023-01-02T20:15:39.783" v="3509" actId="20577"/>
+          <ac:chgData name="Joshua Ho" userId="f21a5117-53dc-4271-a79b-0a4f548af6e1" providerId="ADAL" clId="{30F5B7B2-929C-4119-8584-3764F0694251}" dt="2023-01-03T16:52:28.492" v="3801" actId="27636"/>
           <ac:spMkLst>
             <pc:docMk/>
             <pc:sldMk cId="3263097216" sldId="256"/>
@@ -158,13 +158,21 @@
           </ac:spMkLst>
         </pc:spChg>
         <pc:spChg chg="mod">
-          <ac:chgData name="Joshua Ho" userId="f21a5117-53dc-4271-a79b-0a4f548af6e1" providerId="ADAL" clId="{30F5B7B2-929C-4119-8584-3764F0694251}" dt="2023-01-03T04:13:56.065" v="3753" actId="20577"/>
+          <ac:chgData name="Joshua Ho" userId="f21a5117-53dc-4271-a79b-0a4f548af6e1" providerId="ADAL" clId="{30F5B7B2-929C-4119-8584-3764F0694251}" dt="2023-01-03T16:52:24.365" v="3797" actId="404"/>
           <ac:spMkLst>
             <pc:docMk/>
             <pc:sldMk cId="3263097216" sldId="256"/>
             <ac:spMk id="3" creationId="{07AEE2E8-7BFF-A490-D869-C41B49307607}"/>
           </ac:spMkLst>
         </pc:spChg>
+        <pc:picChg chg="add mod">
+          <ac:chgData name="Joshua Ho" userId="f21a5117-53dc-4271-a79b-0a4f548af6e1" providerId="ADAL" clId="{30F5B7B2-929C-4119-8584-3764F0694251}" dt="2023-01-03T16:51:48.142" v="3794" actId="1076"/>
+          <ac:picMkLst>
+            <pc:docMk/>
+            <pc:sldMk cId="3263097216" sldId="256"/>
+            <ac:picMk id="1026" creationId="{0C805ACF-7096-4191-300E-046A01BD8C3E}"/>
+          </ac:picMkLst>
+        </pc:picChg>
         <pc:picChg chg="add del mod">
           <ac:chgData name="Joshua Ho" userId="f21a5117-53dc-4271-a79b-0a4f548af6e1" providerId="ADAL" clId="{30F5B7B2-929C-4119-8584-3764F0694251}" dt="2023-01-02T20:15:42.038" v="3510" actId="21"/>
           <ac:picMkLst>
@@ -175,13 +183,13 @@
         </pc:picChg>
       </pc:sldChg>
       <pc:sldChg chg="addSp delSp modSp mod modClrScheme chgLayout">
-        <pc:chgData name="Joshua Ho" userId="f21a5117-53dc-4271-a79b-0a4f548af6e1" providerId="ADAL" clId="{30F5B7B2-929C-4119-8584-3764F0694251}" dt="2023-01-02T20:19:34.308" v="3548" actId="1076"/>
+        <pc:chgData name="Joshua Ho" userId="f21a5117-53dc-4271-a79b-0a4f548af6e1" providerId="ADAL" clId="{30F5B7B2-929C-4119-8584-3764F0694251}" dt="2023-01-03T16:52:57.199" v="3808" actId="113"/>
         <pc:sldMkLst>
           <pc:docMk/>
           <pc:sldMk cId="4017487795" sldId="258"/>
         </pc:sldMkLst>
         <pc:spChg chg="mod ord">
-          <ac:chgData name="Joshua Ho" userId="f21a5117-53dc-4271-a79b-0a4f548af6e1" providerId="ADAL" clId="{30F5B7B2-929C-4119-8584-3764F0694251}" dt="2023-01-02T20:19:26.164" v="3543" actId="700"/>
+          <ac:chgData name="Joshua Ho" userId="f21a5117-53dc-4271-a79b-0a4f548af6e1" providerId="ADAL" clId="{30F5B7B2-929C-4119-8584-3764F0694251}" dt="2023-01-03T16:52:57.199" v="3808" actId="113"/>
           <ac:spMkLst>
             <pc:docMk/>
             <pc:sldMk cId="4017487795" sldId="258"/>
@@ -213,12 +221,20 @@
           </ac:picMkLst>
         </pc:picChg>
       </pc:sldChg>
-      <pc:sldChg chg="addSp delSp modSp">
-        <pc:chgData name="Joshua Ho" userId="f21a5117-53dc-4271-a79b-0a4f548af6e1" providerId="ADAL" clId="{30F5B7B2-929C-4119-8584-3764F0694251}" dt="2023-01-02T20:15:44.884" v="3512"/>
+      <pc:sldChg chg="addSp delSp modSp mod">
+        <pc:chgData name="Joshua Ho" userId="f21a5117-53dc-4271-a79b-0a4f548af6e1" providerId="ADAL" clId="{30F5B7B2-929C-4119-8584-3764F0694251}" dt="2023-01-03T16:52:45.472" v="3805" actId="113"/>
         <pc:sldMkLst>
           <pc:docMk/>
           <pc:sldMk cId="183318859" sldId="259"/>
         </pc:sldMkLst>
+        <pc:spChg chg="mod">
+          <ac:chgData name="Joshua Ho" userId="f21a5117-53dc-4271-a79b-0a4f548af6e1" providerId="ADAL" clId="{30F5B7B2-929C-4119-8584-3764F0694251}" dt="2023-01-03T16:52:45.472" v="3805" actId="113"/>
+          <ac:spMkLst>
+            <pc:docMk/>
+            <pc:sldMk cId="183318859" sldId="259"/>
+            <ac:spMk id="2" creationId="{5FC20122-A39F-10B9-1F0A-0BE504731320}"/>
+          </ac:spMkLst>
+        </pc:spChg>
         <pc:picChg chg="add del mod">
           <ac:chgData name="Joshua Ho" userId="f21a5117-53dc-4271-a79b-0a4f548af6e1" providerId="ADAL" clId="{30F5B7B2-929C-4119-8584-3764F0694251}" dt="2023-01-02T20:15:44.884" v="3512"/>
           <ac:picMkLst>
@@ -229,11 +245,19 @@
         </pc:picChg>
       </pc:sldChg>
       <pc:sldChg chg="addSp modSp mod">
-        <pc:chgData name="Joshua Ho" userId="f21a5117-53dc-4271-a79b-0a4f548af6e1" providerId="ADAL" clId="{30F5B7B2-929C-4119-8584-3764F0694251}" dt="2023-01-02T20:15:53.266" v="3518" actId="1076"/>
+        <pc:chgData name="Joshua Ho" userId="f21a5117-53dc-4271-a79b-0a4f548af6e1" providerId="ADAL" clId="{30F5B7B2-929C-4119-8584-3764F0694251}" dt="2023-01-03T16:52:48.550" v="3806" actId="113"/>
         <pc:sldMkLst>
           <pc:docMk/>
           <pc:sldMk cId="2551494371" sldId="260"/>
         </pc:sldMkLst>
+        <pc:spChg chg="mod">
+          <ac:chgData name="Joshua Ho" userId="f21a5117-53dc-4271-a79b-0a4f548af6e1" providerId="ADAL" clId="{30F5B7B2-929C-4119-8584-3764F0694251}" dt="2023-01-03T16:52:48.550" v="3806" actId="113"/>
+          <ac:spMkLst>
+            <pc:docMk/>
+            <pc:sldMk cId="2551494371" sldId="260"/>
+            <ac:spMk id="2" creationId="{B6C33207-B3B4-CD18-9FC5-8DD04301A56A}"/>
+          </ac:spMkLst>
+        </pc:spChg>
         <pc:spChg chg="mod">
           <ac:chgData name="Joshua Ho" userId="f21a5117-53dc-4271-a79b-0a4f548af6e1" providerId="ADAL" clId="{30F5B7B2-929C-4119-8584-3764F0694251}" dt="2023-01-02T18:29:21.181" v="428" actId="20577"/>
           <ac:spMkLst>
@@ -251,14 +275,29 @@
           </ac:picMkLst>
         </pc:picChg>
       </pc:sldChg>
+      <pc:sldChg chg="modSp mod">
+        <pc:chgData name="Joshua Ho" userId="f21a5117-53dc-4271-a79b-0a4f548af6e1" providerId="ADAL" clId="{30F5B7B2-929C-4119-8584-3764F0694251}" dt="2023-01-03T16:52:52.634" v="3807" actId="113"/>
+        <pc:sldMkLst>
+          <pc:docMk/>
+          <pc:sldMk cId="2130950201" sldId="261"/>
+        </pc:sldMkLst>
+        <pc:spChg chg="mod">
+          <ac:chgData name="Joshua Ho" userId="f21a5117-53dc-4271-a79b-0a4f548af6e1" providerId="ADAL" clId="{30F5B7B2-929C-4119-8584-3764F0694251}" dt="2023-01-03T16:52:52.634" v="3807" actId="113"/>
+          <ac:spMkLst>
+            <pc:docMk/>
+            <pc:sldMk cId="2130950201" sldId="261"/>
+            <ac:spMk id="2" creationId="{5FC20122-A39F-10B9-1F0A-0BE504731320}"/>
+          </ac:spMkLst>
+        </pc:spChg>
+      </pc:sldChg>
       <pc:sldChg chg="addSp delSp modSp mod modClrScheme chgLayout modNotesTx">
-        <pc:chgData name="Joshua Ho" userId="f21a5117-53dc-4271-a79b-0a4f548af6e1" providerId="ADAL" clId="{30F5B7B2-929C-4119-8584-3764F0694251}" dt="2023-01-03T02:30:51.462" v="3650" actId="20577"/>
+        <pc:chgData name="Joshua Ho" userId="f21a5117-53dc-4271-a79b-0a4f548af6e1" providerId="ADAL" clId="{30F5B7B2-929C-4119-8584-3764F0694251}" dt="2023-01-03T16:52:41.672" v="3804" actId="113"/>
         <pc:sldMkLst>
           <pc:docMk/>
           <pc:sldMk cId="1864157926" sldId="262"/>
         </pc:sldMkLst>
         <pc:spChg chg="mod ord">
-          <ac:chgData name="Joshua Ho" userId="f21a5117-53dc-4271-a79b-0a4f548af6e1" providerId="ADAL" clId="{30F5B7B2-929C-4119-8584-3764F0694251}" dt="2023-01-02T20:19:43.817" v="3549" actId="700"/>
+          <ac:chgData name="Joshua Ho" userId="f21a5117-53dc-4271-a79b-0a4f548af6e1" providerId="ADAL" clId="{30F5B7B2-929C-4119-8584-3764F0694251}" dt="2023-01-03T16:52:41.672" v="3804" actId="113"/>
           <ac:spMkLst>
             <pc:docMk/>
             <pc:sldMk cId="1864157926" sldId="262"/>
@@ -281,14 +320,37 @@
             <ac:spMk id="4" creationId="{93D4F032-1DCB-AA48-0664-482FABD6B4FD}"/>
           </ac:spMkLst>
         </pc:spChg>
+        <pc:picChg chg="add mod">
+          <ac:chgData name="Joshua Ho" userId="f21a5117-53dc-4271-a79b-0a4f548af6e1" providerId="ADAL" clId="{30F5B7B2-929C-4119-8584-3764F0694251}" dt="2023-01-03T16:50:58.692" v="3775" actId="1076"/>
+          <ac:picMkLst>
+            <pc:docMk/>
+            <pc:sldMk cId="1864157926" sldId="262"/>
+            <ac:picMk id="4" creationId="{891090DE-2C3C-83E5-52DD-01FB8DE6CF48}"/>
+          </ac:picMkLst>
+        </pc:picChg>
         <pc:picChg chg="add del mod">
-          <ac:chgData name="Joshua Ho" userId="f21a5117-53dc-4271-a79b-0a4f548af6e1" providerId="ADAL" clId="{30F5B7B2-929C-4119-8584-3764F0694251}" dt="2023-01-02T20:19:55.721" v="3555" actId="1076"/>
+          <ac:chgData name="Joshua Ho" userId="f21a5117-53dc-4271-a79b-0a4f548af6e1" providerId="ADAL" clId="{30F5B7B2-929C-4119-8584-3764F0694251}" dt="2023-01-03T16:50:38.247" v="3763" actId="478"/>
           <ac:picMkLst>
             <pc:docMk/>
             <pc:sldMk cId="1864157926" sldId="262"/>
             <ac:picMk id="2050" creationId="{8456D573-91CA-0C6F-0D17-1F3A77491C8E}"/>
           </ac:picMkLst>
         </pc:picChg>
+      </pc:sldChg>
+      <pc:sldChg chg="modSp mod">
+        <pc:chgData name="Joshua Ho" userId="f21a5117-53dc-4271-a79b-0a4f548af6e1" providerId="ADAL" clId="{30F5B7B2-929C-4119-8584-3764F0694251}" dt="2023-01-03T16:53:02.588" v="3809" actId="113"/>
+        <pc:sldMkLst>
+          <pc:docMk/>
+          <pc:sldMk cId="3248488587" sldId="263"/>
+        </pc:sldMkLst>
+        <pc:spChg chg="mod">
+          <ac:chgData name="Joshua Ho" userId="f21a5117-53dc-4271-a79b-0a4f548af6e1" providerId="ADAL" clId="{30F5B7B2-929C-4119-8584-3764F0694251}" dt="2023-01-03T16:53:02.588" v="3809" actId="113"/>
+          <ac:spMkLst>
+            <pc:docMk/>
+            <pc:sldMk cId="3248488587" sldId="263"/>
+            <ac:spMk id="2" creationId="{5FC20122-A39F-10B9-1F0A-0BE504731320}"/>
+          </ac:spMkLst>
+        </pc:spChg>
       </pc:sldChg>
       <pc:sldChg chg="addSp delSp modSp mod modClrScheme chgLayout">
         <pc:chgData name="Joshua Ho" userId="f21a5117-53dc-4271-a79b-0a4f548af6e1" providerId="ADAL" clId="{30F5B7B2-929C-4119-8584-3764F0694251}" dt="2023-01-02T18:59:16.746" v="2129" actId="732"/>
@@ -398,6 +460,36 @@
           <pc:docMk/>
           <pc:sldMk cId="107421852" sldId="267"/>
         </pc:sldMkLst>
+      </pc:sldChg>
+      <pc:sldChg chg="modSp mod">
+        <pc:chgData name="Joshua Ho" userId="f21a5117-53dc-4271-a79b-0a4f548af6e1" providerId="ADAL" clId="{30F5B7B2-929C-4119-8584-3764F0694251}" dt="2023-01-03T16:53:22.231" v="3818" actId="113"/>
+        <pc:sldMkLst>
+          <pc:docMk/>
+          <pc:sldMk cId="322646894" sldId="268"/>
+        </pc:sldMkLst>
+        <pc:spChg chg="mod">
+          <ac:chgData name="Joshua Ho" userId="f21a5117-53dc-4271-a79b-0a4f548af6e1" providerId="ADAL" clId="{30F5B7B2-929C-4119-8584-3764F0694251}" dt="2023-01-03T16:53:22.231" v="3818" actId="113"/>
+          <ac:spMkLst>
+            <pc:docMk/>
+            <pc:sldMk cId="322646894" sldId="268"/>
+            <ac:spMk id="2" creationId="{5FC20122-A39F-10B9-1F0A-0BE504731320}"/>
+          </ac:spMkLst>
+        </pc:spChg>
+      </pc:sldChg>
+      <pc:sldChg chg="modSp mod">
+        <pc:chgData name="Joshua Ho" userId="f21a5117-53dc-4271-a79b-0a4f548af6e1" providerId="ADAL" clId="{30F5B7B2-929C-4119-8584-3764F0694251}" dt="2023-01-03T16:54:24.751" v="3860" actId="113"/>
+        <pc:sldMkLst>
+          <pc:docMk/>
+          <pc:sldMk cId="1145034388" sldId="269"/>
+        </pc:sldMkLst>
+        <pc:spChg chg="mod">
+          <ac:chgData name="Joshua Ho" userId="f21a5117-53dc-4271-a79b-0a4f548af6e1" providerId="ADAL" clId="{30F5B7B2-929C-4119-8584-3764F0694251}" dt="2023-01-03T16:54:24.751" v="3860" actId="113"/>
+          <ac:spMkLst>
+            <pc:docMk/>
+            <pc:sldMk cId="1145034388" sldId="269"/>
+            <ac:spMk id="2" creationId="{5FC20122-A39F-10B9-1F0A-0BE504731320}"/>
+          </ac:spMkLst>
+        </pc:spChg>
       </pc:sldChg>
       <pc:sldChg chg="modSp del mod">
         <pc:chgData name="Joshua Ho" userId="f21a5117-53dc-4271-a79b-0a4f548af6e1" providerId="ADAL" clId="{30F5B7B2-929C-4119-8584-3764F0694251}" dt="2023-01-02T19:32:09.287" v="3235" actId="47"/>
@@ -518,11 +610,19 @@
         </pc:picChg>
       </pc:sldChg>
       <pc:sldChg chg="addSp delSp modSp add mod ord">
-        <pc:chgData name="Joshua Ho" userId="f21a5117-53dc-4271-a79b-0a4f548af6e1" providerId="ADAL" clId="{30F5B7B2-929C-4119-8584-3764F0694251}" dt="2023-01-02T19:16:48.800" v="2307" actId="14100"/>
+        <pc:chgData name="Joshua Ho" userId="f21a5117-53dc-4271-a79b-0a4f548af6e1" providerId="ADAL" clId="{30F5B7B2-929C-4119-8584-3764F0694251}" dt="2023-01-03T16:53:17.071" v="3817" actId="20577"/>
         <pc:sldMkLst>
           <pc:docMk/>
           <pc:sldMk cId="1126637772" sldId="275"/>
         </pc:sldMkLst>
+        <pc:spChg chg="mod">
+          <ac:chgData name="Joshua Ho" userId="f21a5117-53dc-4271-a79b-0a4f548af6e1" providerId="ADAL" clId="{30F5B7B2-929C-4119-8584-3764F0694251}" dt="2023-01-03T16:53:17.071" v="3817" actId="20577"/>
+          <ac:spMkLst>
+            <pc:docMk/>
+            <pc:sldMk cId="1126637772" sldId="275"/>
+            <ac:spMk id="2" creationId="{DF307C55-FB32-6DD6-9AA2-CD768A2F11D4}"/>
+          </ac:spMkLst>
+        </pc:spChg>
         <pc:picChg chg="add mod modCrop">
           <ac:chgData name="Joshua Ho" userId="f21a5117-53dc-4271-a79b-0a4f548af6e1" providerId="ADAL" clId="{30F5B7B2-929C-4119-8584-3764F0694251}" dt="2023-01-02T19:16:24.866" v="2301" actId="14100"/>
           <ac:picMkLst>
@@ -596,7 +696,7 @@
         </pc:picChg>
       </pc:sldChg>
       <pc:sldChg chg="addSp delSp modSp new mod modClrScheme chgLayout">
-        <pc:chgData name="Joshua Ho" userId="f21a5117-53dc-4271-a79b-0a4f548af6e1" providerId="ADAL" clId="{30F5B7B2-929C-4119-8584-3764F0694251}" dt="2023-01-03T02:31:34.649" v="3711" actId="404"/>
+        <pc:chgData name="Joshua Ho" userId="f21a5117-53dc-4271-a79b-0a4f548af6e1" providerId="ADAL" clId="{30F5B7B2-929C-4119-8584-3764F0694251}" dt="2023-01-03T16:54:19.645" v="3859" actId="1076"/>
         <pc:sldMkLst>
           <pc:docMk/>
           <pc:sldMk cId="177064512" sldId="276"/>
@@ -609,6 +709,14 @@
             <ac:spMk id="2" creationId="{26ECBFB5-2C2C-8443-4522-13B8643E9301}"/>
           </ac:spMkLst>
         </pc:spChg>
+        <pc:spChg chg="add del mod">
+          <ac:chgData name="Joshua Ho" userId="f21a5117-53dc-4271-a79b-0a4f548af6e1" providerId="ADAL" clId="{30F5B7B2-929C-4119-8584-3764F0694251}" dt="2023-01-03T16:53:25.097" v="3821" actId="21"/>
+          <ac:spMkLst>
+            <pc:docMk/>
+            <pc:sldMk cId="177064512" sldId="276"/>
+            <ac:spMk id="3" creationId="{57E19785-31FF-A1B2-9CCA-C49A05D7336B}"/>
+          </ac:spMkLst>
+        </pc:spChg>
         <pc:spChg chg="del mod ord">
           <ac:chgData name="Joshua Ho" userId="f21a5117-53dc-4271-a79b-0a4f548af6e1" providerId="ADAL" clId="{30F5B7B2-929C-4119-8584-3764F0694251}" dt="2023-01-02T19:17:23.790" v="2309" actId="700"/>
           <ac:spMkLst>
@@ -617,8 +725,8 @@
             <ac:spMk id="3" creationId="{B1A4D420-0DD5-AA9D-AEEE-F8827473CCCB}"/>
           </ac:spMkLst>
         </pc:spChg>
-        <pc:spChg chg="add mod ord">
-          <ac:chgData name="Joshua Ho" userId="f21a5117-53dc-4271-a79b-0a4f548af6e1" providerId="ADAL" clId="{30F5B7B2-929C-4119-8584-3764F0694251}" dt="2023-01-02T20:25:09.060" v="3592" actId="700"/>
+        <pc:spChg chg="add del mod ord">
+          <ac:chgData name="Joshua Ho" userId="f21a5117-53dc-4271-a79b-0a4f548af6e1" providerId="ADAL" clId="{30F5B7B2-929C-4119-8584-3764F0694251}" dt="2023-01-03T16:54:08.335" v="3852" actId="113"/>
           <ac:spMkLst>
             <pc:docMk/>
             <pc:sldMk cId="177064512" sldId="276"/>
@@ -631,6 +739,14 @@
             <pc:docMk/>
             <pc:sldMk cId="177064512" sldId="276"/>
             <ac:spMk id="5" creationId="{931E37D0-D8D4-34FD-E23B-C9471B582C9B}"/>
+          </ac:spMkLst>
+        </pc:spChg>
+        <pc:spChg chg="add mod">
+          <ac:chgData name="Joshua Ho" userId="f21a5117-53dc-4271-a79b-0a4f548af6e1" providerId="ADAL" clId="{30F5B7B2-929C-4119-8584-3764F0694251}" dt="2023-01-03T16:54:19.645" v="3859" actId="1076"/>
+          <ac:spMkLst>
+            <pc:docMk/>
+            <pc:sldMk cId="177064512" sldId="276"/>
+            <ac:spMk id="6" creationId="{192E736B-4564-C6E8-E43E-0A615EB3B64D}"/>
           </ac:spMkLst>
         </pc:spChg>
         <pc:spChg chg="add del mod">
@@ -714,7 +830,7 @@
         </pc:sldMkLst>
       </pc:sldChg>
       <pc:sldChg chg="addSp delSp modSp add mod modClrScheme chgLayout">
-        <pc:chgData name="Joshua Ho" userId="f21a5117-53dc-4271-a79b-0a4f548af6e1" providerId="ADAL" clId="{30F5B7B2-929C-4119-8584-3764F0694251}" dt="2023-01-02T20:25:58.897" v="3605" actId="1076"/>
+        <pc:chgData name="Joshua Ho" userId="f21a5117-53dc-4271-a79b-0a4f548af6e1" providerId="ADAL" clId="{30F5B7B2-929C-4119-8584-3764F0694251}" dt="2023-01-03T16:58:18.442" v="4202" actId="20577"/>
         <pc:sldMkLst>
           <pc:docMk/>
           <pc:sldMk cId="1889622697" sldId="277"/>
@@ -728,7 +844,7 @@
           </ac:spMkLst>
         </pc:spChg>
         <pc:spChg chg="mod ord">
-          <ac:chgData name="Joshua Ho" userId="f21a5117-53dc-4271-a79b-0a4f548af6e1" providerId="ADAL" clId="{30F5B7B2-929C-4119-8584-3764F0694251}" dt="2023-01-02T20:25:45.488" v="3600" actId="700"/>
+          <ac:chgData name="Joshua Ho" userId="f21a5117-53dc-4271-a79b-0a4f548af6e1" providerId="ADAL" clId="{30F5B7B2-929C-4119-8584-3764F0694251}" dt="2023-01-03T16:54:27.837" v="3861" actId="113"/>
           <ac:spMkLst>
             <pc:docMk/>
             <pc:sldMk cId="1889622697" sldId="277"/>
@@ -736,7 +852,7 @@
           </ac:spMkLst>
         </pc:spChg>
         <pc:spChg chg="mod ord">
-          <ac:chgData name="Joshua Ho" userId="f21a5117-53dc-4271-a79b-0a4f548af6e1" providerId="ADAL" clId="{30F5B7B2-929C-4119-8584-3764F0694251}" dt="2023-01-02T20:25:45.488" v="3600" actId="700"/>
+          <ac:chgData name="Joshua Ho" userId="f21a5117-53dc-4271-a79b-0a4f548af6e1" providerId="ADAL" clId="{30F5B7B2-929C-4119-8584-3764F0694251}" dt="2023-01-03T16:58:18.442" v="4202" actId="20577"/>
           <ac:spMkLst>
             <pc:docMk/>
             <pc:sldMk cId="1889622697" sldId="277"/>
@@ -753,7 +869,7 @@
         </pc:picChg>
       </pc:sldChg>
       <pc:sldChg chg="addSp modSp add mod">
-        <pc:chgData name="Joshua Ho" userId="f21a5117-53dc-4271-a79b-0a4f548af6e1" providerId="ADAL" clId="{30F5B7B2-929C-4119-8584-3764F0694251}" dt="2023-01-03T04:13:28.428" v="3731" actId="27636"/>
+        <pc:chgData name="Joshua Ho" userId="f21a5117-53dc-4271-a79b-0a4f548af6e1" providerId="ADAL" clId="{30F5B7B2-929C-4119-8584-3764F0694251}" dt="2023-01-03T18:02:27.107" v="4787" actId="1076"/>
         <pc:sldMkLst>
           <pc:docMk/>
           <pc:sldMk cId="1699826605" sldId="278"/>
@@ -767,7 +883,7 @@
           </ac:spMkLst>
         </pc:spChg>
         <pc:spChg chg="mod">
-          <ac:chgData name="Joshua Ho" userId="f21a5117-53dc-4271-a79b-0a4f548af6e1" providerId="ADAL" clId="{30F5B7B2-929C-4119-8584-3764F0694251}" dt="2023-01-03T04:13:28.428" v="3731" actId="27636"/>
+          <ac:chgData name="Joshua Ho" userId="f21a5117-53dc-4271-a79b-0a4f548af6e1" providerId="ADAL" clId="{30F5B7B2-929C-4119-8584-3764F0694251}" dt="2023-01-03T18:02:22.570" v="4786" actId="27636"/>
           <ac:spMkLst>
             <pc:docMk/>
             <pc:sldMk cId="1699826605" sldId="278"/>
@@ -775,7 +891,7 @@
           </ac:spMkLst>
         </pc:spChg>
         <pc:picChg chg="add mod">
-          <ac:chgData name="Joshua Ho" userId="f21a5117-53dc-4271-a79b-0a4f548af6e1" providerId="ADAL" clId="{30F5B7B2-929C-4119-8584-3764F0694251}" dt="2023-01-02T20:31:14.015" v="3636" actId="1076"/>
+          <ac:chgData name="Joshua Ho" userId="f21a5117-53dc-4271-a79b-0a4f548af6e1" providerId="ADAL" clId="{30F5B7B2-929C-4119-8584-3764F0694251}" dt="2023-01-03T18:02:27.107" v="4787" actId="1076"/>
           <ac:picMkLst>
             <pc:docMk/>
             <pc:sldMk cId="1699826605" sldId="278"/>
@@ -784,7 +900,7 @@
         </pc:picChg>
       </pc:sldChg>
       <pc:sldChg chg="addSp delSp modSp add mod ord modClrScheme chgLayout">
-        <pc:chgData name="Joshua Ho" userId="f21a5117-53dc-4271-a79b-0a4f548af6e1" providerId="ADAL" clId="{30F5B7B2-929C-4119-8584-3764F0694251}" dt="2023-01-03T04:13:36.835" v="3744" actId="20577"/>
+        <pc:chgData name="Joshua Ho" userId="f21a5117-53dc-4271-a79b-0a4f548af6e1" providerId="ADAL" clId="{30F5B7B2-929C-4119-8584-3764F0694251}" dt="2023-01-03T18:04:06.794" v="4847" actId="113"/>
         <pc:sldMkLst>
           <pc:docMk/>
           <pc:sldMk cId="2899897877" sldId="279"/>
@@ -798,7 +914,7 @@
           </ac:spMkLst>
         </pc:spChg>
         <pc:spChg chg="mod ord">
-          <ac:chgData name="Joshua Ho" userId="f21a5117-53dc-4271-a79b-0a4f548af6e1" providerId="ADAL" clId="{30F5B7B2-929C-4119-8584-3764F0694251}" dt="2023-01-02T19:32:25.441" v="3255" actId="700"/>
+          <ac:chgData name="Joshua Ho" userId="f21a5117-53dc-4271-a79b-0a4f548af6e1" providerId="ADAL" clId="{30F5B7B2-929C-4119-8584-3764F0694251}" dt="2023-01-03T18:03:50.489" v="4843" actId="20577"/>
           <ac:spMkLst>
             <pc:docMk/>
             <pc:sldMk cId="2899897877" sldId="279"/>
@@ -806,13 +922,61 @@
           </ac:spMkLst>
         </pc:spChg>
         <pc:spChg chg="mod ord">
-          <ac:chgData name="Joshua Ho" userId="f21a5117-53dc-4271-a79b-0a4f548af6e1" providerId="ADAL" clId="{30F5B7B2-929C-4119-8584-3764F0694251}" dt="2023-01-03T04:13:36.835" v="3744" actId="20577"/>
+          <ac:chgData name="Joshua Ho" userId="f21a5117-53dc-4271-a79b-0a4f548af6e1" providerId="ADAL" clId="{30F5B7B2-929C-4119-8584-3764F0694251}" dt="2023-01-03T18:04:06.794" v="4847" actId="113"/>
           <ac:spMkLst>
             <pc:docMk/>
             <pc:sldMk cId="2899897877" sldId="279"/>
             <ac:spMk id="5" creationId="{931E37D0-D8D4-34FD-E23B-C9471B582C9B}"/>
           </ac:spMkLst>
         </pc:spChg>
+        <pc:picChg chg="add del mod">
+          <ac:chgData name="Joshua Ho" userId="f21a5117-53dc-4271-a79b-0a4f548af6e1" providerId="ADAL" clId="{30F5B7B2-929C-4119-8584-3764F0694251}" dt="2023-01-03T17:16:14.793" v="4327" actId="478"/>
+          <ac:picMkLst>
+            <pc:docMk/>
+            <pc:sldMk cId="2899897877" sldId="279"/>
+            <ac:picMk id="3" creationId="{012E40BD-D267-98A0-5D26-51FAA6C32942}"/>
+          </ac:picMkLst>
+        </pc:picChg>
+        <pc:picChg chg="add del mod">
+          <ac:chgData name="Joshua Ho" userId="f21a5117-53dc-4271-a79b-0a4f548af6e1" providerId="ADAL" clId="{30F5B7B2-929C-4119-8584-3764F0694251}" dt="2023-01-03T17:16:57.265" v="4338" actId="478"/>
+          <ac:picMkLst>
+            <pc:docMk/>
+            <pc:sldMk cId="2899897877" sldId="279"/>
+            <ac:picMk id="7" creationId="{57355325-C0AF-3D4A-B78E-58A4AFFE7E4C}"/>
+          </ac:picMkLst>
+        </pc:picChg>
+        <pc:picChg chg="add del mod">
+          <ac:chgData name="Joshua Ho" userId="f21a5117-53dc-4271-a79b-0a4f548af6e1" providerId="ADAL" clId="{30F5B7B2-929C-4119-8584-3764F0694251}" dt="2023-01-03T17:16:26.626" v="4330" actId="478"/>
+          <ac:picMkLst>
+            <pc:docMk/>
+            <pc:sldMk cId="2899897877" sldId="279"/>
+            <ac:picMk id="9" creationId="{49629516-BED4-F841-FB29-27A94C69754F}"/>
+          </ac:picMkLst>
+        </pc:picChg>
+        <pc:picChg chg="add del mod">
+          <ac:chgData name="Joshua Ho" userId="f21a5117-53dc-4271-a79b-0a4f548af6e1" providerId="ADAL" clId="{30F5B7B2-929C-4119-8584-3764F0694251}" dt="2023-01-03T17:40:07.736" v="4466" actId="478"/>
+          <ac:picMkLst>
+            <pc:docMk/>
+            <pc:sldMk cId="2899897877" sldId="279"/>
+            <ac:picMk id="11" creationId="{4DB694CB-2CA2-5FED-E5A4-38063C48BB8B}"/>
+          </ac:picMkLst>
+        </pc:picChg>
+        <pc:picChg chg="add del mod">
+          <ac:chgData name="Joshua Ho" userId="f21a5117-53dc-4271-a79b-0a4f548af6e1" providerId="ADAL" clId="{30F5B7B2-929C-4119-8584-3764F0694251}" dt="2023-01-03T17:40:08.514" v="4468" actId="478"/>
+          <ac:picMkLst>
+            <pc:docMk/>
+            <pc:sldMk cId="2899897877" sldId="279"/>
+            <ac:picMk id="13" creationId="{8C67F987-C46E-6D95-27AC-03321B085900}"/>
+          </ac:picMkLst>
+        </pc:picChg>
+        <pc:picChg chg="add del mod">
+          <ac:chgData name="Joshua Ho" userId="f21a5117-53dc-4271-a79b-0a4f548af6e1" providerId="ADAL" clId="{30F5B7B2-929C-4119-8584-3764F0694251}" dt="2023-01-03T17:40:08.004" v="4467" actId="478"/>
+          <ac:picMkLst>
+            <pc:docMk/>
+            <pc:sldMk cId="2899897877" sldId="279"/>
+            <ac:picMk id="15" creationId="{B37E4CB4-D134-E44A-350B-66FCFDAB14F4}"/>
+          </ac:picMkLst>
+        </pc:picChg>
       </pc:sldChg>
     </pc:docChg>
   </pc:docChgLst>
@@ -901,7 +1065,7 @@
           <a:p>
             <a:fld id="{69D4A913-E6C0-40F8-B8BB-A31E1DC9E464}" type="datetimeFigureOut">
               <a:rPr lang="en-CA" smtClean="0"/>
-              <a:t>2023-01-02</a:t>
+              <a:t>2023-01-03</a:t>
             </a:fld>
             <a:endParaRPr lang="en-CA"/>
           </a:p>
@@ -1668,7 +1832,7 @@
           <a:p>
             <a:fld id="{6EC3F6C6-7A8A-42D4-B910-B91F202250AE}" type="datetimeFigureOut">
               <a:rPr lang="en-CA" smtClean="0"/>
-              <a:t>2023-01-02</a:t>
+              <a:t>2023-01-03</a:t>
             </a:fld>
             <a:endParaRPr lang="en-CA"/>
           </a:p>
@@ -1838,7 +2002,7 @@
           <a:p>
             <a:fld id="{6EC3F6C6-7A8A-42D4-B910-B91F202250AE}" type="datetimeFigureOut">
               <a:rPr lang="en-CA" smtClean="0"/>
-              <a:t>2023-01-02</a:t>
+              <a:t>2023-01-03</a:t>
             </a:fld>
             <a:endParaRPr lang="en-CA"/>
           </a:p>
@@ -2018,7 +2182,7 @@
           <a:p>
             <a:fld id="{6EC3F6C6-7A8A-42D4-B910-B91F202250AE}" type="datetimeFigureOut">
               <a:rPr lang="en-CA" smtClean="0"/>
-              <a:t>2023-01-02</a:t>
+              <a:t>2023-01-03</a:t>
             </a:fld>
             <a:endParaRPr lang="en-CA"/>
           </a:p>
@@ -2188,7 +2352,7 @@
           <a:p>
             <a:fld id="{6EC3F6C6-7A8A-42D4-B910-B91F202250AE}" type="datetimeFigureOut">
               <a:rPr lang="en-CA" smtClean="0"/>
-              <a:t>2023-01-02</a:t>
+              <a:t>2023-01-03</a:t>
             </a:fld>
             <a:endParaRPr lang="en-CA"/>
           </a:p>
@@ -2456,7 +2620,7 @@
           <a:p>
             <a:fld id="{6EC3F6C6-7A8A-42D4-B910-B91F202250AE}" type="datetimeFigureOut">
               <a:rPr lang="en-CA" smtClean="0"/>
-              <a:t>2023-01-02</a:t>
+              <a:t>2023-01-03</a:t>
             </a:fld>
             <a:endParaRPr lang="en-CA"/>
           </a:p>
@@ -2688,7 +2852,7 @@
           <a:p>
             <a:fld id="{6EC3F6C6-7A8A-42D4-B910-B91F202250AE}" type="datetimeFigureOut">
               <a:rPr lang="en-CA" smtClean="0"/>
-              <a:t>2023-01-02</a:t>
+              <a:t>2023-01-03</a:t>
             </a:fld>
             <a:endParaRPr lang="en-CA"/>
           </a:p>
@@ -3047,7 +3211,7 @@
           <a:p>
             <a:fld id="{6EC3F6C6-7A8A-42D4-B910-B91F202250AE}" type="datetimeFigureOut">
               <a:rPr lang="en-CA" smtClean="0"/>
-              <a:t>2023-01-02</a:t>
+              <a:t>2023-01-03</a:t>
             </a:fld>
             <a:endParaRPr lang="en-CA"/>
           </a:p>
@@ -3188,7 +3352,7 @@
           <a:p>
             <a:fld id="{6EC3F6C6-7A8A-42D4-B910-B91F202250AE}" type="datetimeFigureOut">
               <a:rPr lang="en-CA" smtClean="0"/>
-              <a:t>2023-01-02</a:t>
+              <a:t>2023-01-03</a:t>
             </a:fld>
             <a:endParaRPr lang="en-CA"/>
           </a:p>
@@ -3283,7 +3447,7 @@
           <a:p>
             <a:fld id="{6EC3F6C6-7A8A-42D4-B910-B91F202250AE}" type="datetimeFigureOut">
               <a:rPr lang="en-CA" smtClean="0"/>
-              <a:t>2023-01-02</a:t>
+              <a:t>2023-01-03</a:t>
             </a:fld>
             <a:endParaRPr lang="en-CA"/>
           </a:p>
@@ -3640,7 +3804,7 @@
           <a:p>
             <a:fld id="{6EC3F6C6-7A8A-42D4-B910-B91F202250AE}" type="datetimeFigureOut">
               <a:rPr lang="en-CA" smtClean="0"/>
-              <a:t>2023-01-02</a:t>
+              <a:t>2023-01-03</a:t>
             </a:fld>
             <a:endParaRPr lang="en-CA"/>
           </a:p>
@@ -3997,7 +4161,7 @@
           <a:p>
             <a:fld id="{6EC3F6C6-7A8A-42D4-B910-B91F202250AE}" type="datetimeFigureOut">
               <a:rPr lang="en-CA" smtClean="0"/>
-              <a:t>2023-01-02</a:t>
+              <a:t>2023-01-03</a:t>
             </a:fld>
             <a:endParaRPr lang="en-CA"/>
           </a:p>
@@ -4239,7 +4403,7 @@
           <a:p>
             <a:fld id="{6EC3F6C6-7A8A-42D4-B910-B91F202250AE}" type="datetimeFigureOut">
               <a:rPr lang="en-CA" smtClean="0"/>
-              <a:t>2023-01-02</a:t>
+              <a:t>2023-01-03</a:t>
             </a:fld>
             <a:endParaRPr lang="en-CA"/>
           </a:p>
@@ -4744,36 +4908,72 @@
             <p:ph type="subTitle" idx="1"/>
           </p:nvPr>
         </p:nvSpPr>
-        <p:spPr/>
-        <p:txBody>
-          <a:bodyPr/>
+        <p:spPr>
+          <a:xfrm>
+            <a:off x="3949395" y="4032664"/>
+            <a:ext cx="4293210" cy="747061"/>
+          </a:xfrm>
+        </p:spPr>
+        <p:txBody>
+          <a:bodyPr>
+            <a:normAutofit/>
+          </a:bodyPr>
           <a:lstStyle/>
           <a:p>
             <a:r>
-              <a:rPr lang="en-CA" dirty="0"/>
+              <a:rPr lang="en-CA" sz="2800" b="1" dirty="0"/>
               <a:t>By Josh Ho</a:t>
             </a:r>
           </a:p>
-          <a:p>
-            <a:r>
-              <a:rPr lang="en-CA"/>
-              <a:t>January 3</a:t>
-            </a:r>
-            <a:r>
-              <a:rPr lang="en-CA" baseline="30000"/>
-              <a:t>rd</a:t>
-            </a:r>
-            <a:r>
-              <a:rPr lang="en-CA"/>
-              <a:t>, </a:t>
-            </a:r>
-            <a:r>
-              <a:rPr lang="en-CA" dirty="0"/>
-              <a:t>2023</a:t>
-            </a:r>
-          </a:p>
-        </p:txBody>
-      </p:sp>
+        </p:txBody>
+      </p:sp>
+      <p:pic>
+        <p:nvPicPr>
+          <p:cNvPr id="1026" name="Picture 2" descr="Benefits of Natural Language Processing for the Supply Chain - Blume Global">
+            <a:extLst>
+              <a:ext uri="{FF2B5EF4-FFF2-40B4-BE49-F238E27FC236}">
+                <a16:creationId xmlns:a16="http://schemas.microsoft.com/office/drawing/2014/main" id="{0C805ACF-7096-4191-300E-046A01BD8C3E}"/>
+              </a:ext>
+            </a:extLst>
+          </p:cNvPr>
+          <p:cNvPicPr>
+            <a:picLocks noChangeAspect="1" noChangeArrowheads="1"/>
+          </p:cNvPicPr>
+          <p:nvPr/>
+        </p:nvPicPr>
+        <p:blipFill>
+          <a:blip r:embed="rId2">
+            <a:extLst>
+              <a:ext uri="{28A0092B-C50C-407E-A947-70E740481C1C}">
+                <a14:useLocalDpi xmlns:a14="http://schemas.microsoft.com/office/drawing/2010/main" val="0"/>
+              </a:ext>
+            </a:extLst>
+          </a:blip>
+          <a:srcRect/>
+          <a:stretch>
+            <a:fillRect/>
+          </a:stretch>
+        </p:blipFill>
+        <p:spPr bwMode="auto">
+          <a:xfrm>
+            <a:off x="4517287" y="4667883"/>
+            <a:ext cx="3157426" cy="2105276"/>
+          </a:xfrm>
+          <a:prstGeom prst="rect">
+            <a:avLst/>
+          </a:prstGeom>
+          <a:noFill/>
+          <a:extLst>
+            <a:ext uri="{909E8E84-426E-40DD-AFC4-6F175D3DCCD1}">
+              <a14:hiddenFill xmlns:a14="http://schemas.microsoft.com/office/drawing/2010/main">
+                <a:solidFill>
+                  <a:srgbClr val="FFFFFF"/>
+                </a:solidFill>
+              </a14:hiddenFill>
+            </a:ext>
+          </a:extLst>
+        </p:spPr>
+      </p:pic>
     </p:spTree>
     <p:extLst>
       <p:ext uri="{BB962C8B-B14F-4D97-AF65-F5344CB8AC3E}">
@@ -5248,14 +5448,14 @@
           <a:p>
             <a:r>
               <a:rPr lang="en-CA" sz="2200" b="1" dirty="0"/>
-              <a:t>Eda #2</a:t>
+              <a:t>Eda #3</a:t>
             </a:r>
             <a:br>
               <a:rPr lang="en-CA" sz="2200" dirty="0"/>
             </a:br>
             <a:r>
               <a:rPr lang="en-CA" sz="2700" dirty="0"/>
-              <a:t>top stopwords</a:t>
+              <a:t>top words</a:t>
             </a:r>
             <a:endParaRPr lang="en-CA" sz="3200" dirty="0"/>
           </a:p>
@@ -5663,7 +5863,7 @@
               <a:rPr lang="en-CA" dirty="0"/>
             </a:br>
             <a:r>
-              <a:rPr lang="en-CA" dirty="0"/>
+              <a:rPr lang="en-CA" b="1" dirty="0"/>
               <a:t>text cleaning</a:t>
             </a:r>
           </a:p>
@@ -5721,7 +5921,7 @@
           <a:lstStyle/>
           <a:p>
             <a:r>
-              <a:rPr lang="en-CA" dirty="0"/>
+              <a:rPr lang="en-CA" b="1" dirty="0"/>
               <a:t>Text cleaning</a:t>
             </a:r>
           </a:p>
@@ -5874,6 +6074,45 @@
           </a:p>
         </p:txBody>
       </p:sp>
+      <p:sp>
+        <p:nvSpPr>
+          <p:cNvPr id="6" name="TextBox 5">
+            <a:extLst>
+              <a:ext uri="{FF2B5EF4-FFF2-40B4-BE49-F238E27FC236}">
+                <a16:creationId xmlns:a16="http://schemas.microsoft.com/office/drawing/2014/main" id="{192E736B-4564-C6E8-E43E-0A615EB3B64D}"/>
+              </a:ext>
+            </a:extLst>
+          </p:cNvPr>
+          <p:cNvSpPr txBox="1"/>
+          <p:nvPr/>
+        </p:nvSpPr>
+        <p:spPr>
+          <a:xfrm>
+            <a:off x="2204301" y="6128742"/>
+            <a:ext cx="1687398" cy="523220"/>
+          </a:xfrm>
+          <a:prstGeom prst="rect">
+            <a:avLst/>
+          </a:prstGeom>
+          <a:noFill/>
+        </p:spPr>
+        <p:txBody>
+          <a:bodyPr wrap="square" rtlCol="0">
+            <a:spAutoFit/>
+          </a:bodyPr>
+          <a:lstStyle/>
+          <a:p>
+            <a:pPr algn="ctr"/>
+            <a:r>
+              <a:rPr lang="en-CA" sz="2800" b="1" dirty="0">
+                <a:latin typeface="Arial" panose="020B0604020202020204" pitchFamily="34" charset="0"/>
+                <a:cs typeface="Arial" panose="020B0604020202020204" pitchFamily="34" charset="0"/>
+              </a:rPr>
+              <a:t>RE</a:t>
+            </a:r>
+          </a:p>
+        </p:txBody>
+      </p:sp>
     </p:spTree>
     <p:extLst>
       <p:ext uri="{BB962C8B-B14F-4D97-AF65-F5344CB8AC3E}">
@@ -5935,7 +6174,7 @@
               <a:rPr lang="en-CA" dirty="0"/>
             </a:br>
             <a:r>
-              <a:rPr lang="en-CA" dirty="0"/>
+              <a:rPr lang="en-CA" b="1" dirty="0"/>
               <a:t>feature engineering</a:t>
             </a:r>
           </a:p>
@@ -5993,7 +6232,7 @@
           <a:lstStyle/>
           <a:p>
             <a:r>
-              <a:rPr lang="en-CA" dirty="0"/>
+              <a:rPr lang="en-CA" b="1" dirty="0"/>
               <a:t>Feature engineering</a:t>
             </a:r>
           </a:p>
@@ -6024,20 +6263,52 @@
           <a:p>
             <a:r>
               <a:rPr lang="en-CA" sz="2400" dirty="0"/>
-              <a:t>Number of same words in both questions, then standard scaled</a:t>
+              <a:t>Number of same words between each pair of questions</a:t>
             </a:r>
           </a:p>
           <a:p>
             <a:r>
               <a:rPr lang="en-CA" sz="2400" dirty="0"/>
-              <a:t>Word count for each question, then standard scaled</a:t>
+              <a:t>Number of same letters between each pair of questions</a:t>
             </a:r>
           </a:p>
           <a:p>
             <a:r>
               <a:rPr lang="en-CA" sz="2400" dirty="0"/>
-              <a:t>TF-IDF for each pair of questions</a:t>
-            </a:r>
+              <a:t>Character count for each question</a:t>
+            </a:r>
+          </a:p>
+          <a:p>
+            <a:r>
+              <a:rPr lang="en-CA" sz="2400" dirty="0"/>
+              <a:t>Word count for each question</a:t>
+            </a:r>
+          </a:p>
+          <a:p>
+            <a:r>
+              <a:rPr lang="en-CA" sz="2400" dirty="0"/>
+              <a:t>Cosine similarity for each pair of questions, derived from arrays created using TF-IDF</a:t>
+            </a:r>
+          </a:p>
+          <a:p>
+            <a:r>
+              <a:rPr lang="en-CA" sz="2400" dirty="0"/>
+              <a:t>*Scaled with </a:t>
+            </a:r>
+            <a:r>
+              <a:rPr lang="en-CA" sz="2400" dirty="0" err="1"/>
+              <a:t>MinMax</a:t>
+            </a:r>
+            <a:r>
+              <a:rPr lang="en-CA" sz="2400" dirty="0"/>
+              <a:t> (except cosine similarity)</a:t>
+            </a:r>
+          </a:p>
+          <a:p>
+            <a:endParaRPr lang="en-CA" sz="2400" dirty="0"/>
+          </a:p>
+          <a:p>
+            <a:endParaRPr lang="en-CA" sz="2400" dirty="0"/>
           </a:p>
         </p:txBody>
       </p:sp>
@@ -6229,16 +6500,21 @@
             <p:ph idx="1"/>
           </p:nvPr>
         </p:nvSpPr>
-        <p:spPr/>
+        <p:spPr>
+          <a:xfrm>
+            <a:off x="2231136" y="2422690"/>
+            <a:ext cx="7729728" cy="4034672"/>
+          </a:xfrm>
+        </p:spPr>
         <p:txBody>
           <a:bodyPr>
-            <a:normAutofit/>
+            <a:normAutofit lnSpcReduction="10000"/>
           </a:bodyPr>
           <a:lstStyle/>
           <a:p>
             <a:r>
               <a:rPr lang="en-CA" sz="2400" dirty="0"/>
-              <a:t>Train test split engineered features</a:t>
+              <a:t>Train test split engineered features (80/20)</a:t>
             </a:r>
           </a:p>
           <a:p>
@@ -6258,7 +6534,7 @@
             <a:pPr lvl="1"/>
             <a:r>
               <a:rPr lang="en-CA" sz="2200" dirty="0"/>
-              <a:t>Random Forest</a:t>
+              <a:t>K-Nearest Neighbor </a:t>
             </a:r>
           </a:p>
           <a:p>
@@ -6269,10 +6545,34 @@
             </a:r>
           </a:p>
           <a:p>
+            <a:pPr lvl="1"/>
+            <a:r>
+              <a:rPr lang="en-CA" sz="2200" dirty="0"/>
+              <a:t>Random Forest</a:t>
+            </a:r>
+          </a:p>
+          <a:p>
             <a:r>
               <a:rPr lang="en-CA" sz="2400" dirty="0"/>
-              <a:t>Evaluated for accuracy</a:t>
-            </a:r>
+              <a:t>Model evaluation</a:t>
+            </a:r>
+          </a:p>
+          <a:p>
+            <a:pPr lvl="1"/>
+            <a:r>
+              <a:rPr lang="en-CA" sz="2200" dirty="0"/>
+              <a:t>K-Folds Cross-Validation (7 Splits)</a:t>
+            </a:r>
+          </a:p>
+          <a:p>
+            <a:pPr lvl="1"/>
+            <a:r>
+              <a:rPr lang="en-CA" sz="2200" dirty="0"/>
+              <a:t>ROC AUC score</a:t>
+            </a:r>
+          </a:p>
+          <a:p>
+            <a:endParaRPr lang="en-CA" sz="2400" dirty="0"/>
           </a:p>
         </p:txBody>
       </p:sp>
@@ -6305,7 +6605,7 @@
         </p:blipFill>
         <p:spPr bwMode="auto">
           <a:xfrm>
-            <a:off x="8035509" y="2638044"/>
+            <a:off x="8015668" y="2817153"/>
             <a:ext cx="2796881" cy="2796881"/>
           </a:xfrm>
           <a:prstGeom prst="rect">
@@ -6436,7 +6736,7 @@
           <a:p>
             <a:r>
               <a:rPr lang="en-CA" dirty="0"/>
-              <a:t>Model Performance</a:t>
+              <a:t>Model Performances</a:t>
             </a:r>
           </a:p>
         </p:txBody>
@@ -6457,10 +6757,15 @@
             <p:ph idx="1"/>
           </p:nvPr>
         </p:nvSpPr>
-        <p:spPr/>
+        <p:spPr>
+          <a:xfrm>
+            <a:off x="6736080" y="367645"/>
+            <a:ext cx="4815840" cy="6372519"/>
+          </a:xfrm>
+        </p:spPr>
         <p:txBody>
           <a:bodyPr>
-            <a:normAutofit/>
+            <a:normAutofit fontScale="92500" lnSpcReduction="10000"/>
           </a:bodyPr>
           <a:lstStyle/>
           <a:p>
@@ -6473,14 +6778,14 @@
             <a:pPr lvl="1"/>
             <a:r>
               <a:rPr lang="en-CA" sz="2100" dirty="0"/>
-              <a:t>Train score:</a:t>
+              <a:t>Train Score: 74.38%</a:t>
             </a:r>
           </a:p>
           <a:p>
             <a:pPr lvl="1"/>
             <a:r>
               <a:rPr lang="en-CA" sz="2100" dirty="0"/>
-              <a:t>Test score:</a:t>
+              <a:t>Test Score: 74.32%</a:t>
             </a:r>
           </a:p>
           <a:p>
@@ -6490,21 +6795,21 @@
           <a:p>
             <a:r>
               <a:rPr lang="en-CA" sz="2400" dirty="0"/>
-              <a:t>Random Forest</a:t>
+              <a:t>K-Nearest Neighbor</a:t>
             </a:r>
           </a:p>
           <a:p>
             <a:pPr lvl="1"/>
             <a:r>
               <a:rPr lang="en-CA" sz="2100" dirty="0"/>
-              <a:t>Train score:</a:t>
+              <a:t>Train Score: 74.81%</a:t>
             </a:r>
           </a:p>
           <a:p>
             <a:pPr lvl="1"/>
             <a:r>
               <a:rPr lang="en-CA" sz="2100" dirty="0"/>
-              <a:t>Test score:</a:t>
+              <a:t>Test Score: 73.31%</a:t>
             </a:r>
           </a:p>
           <a:p>
@@ -6523,18 +6828,50 @@
             <a:pPr lvl="1"/>
             <a:r>
               <a:rPr lang="en-CA" sz="2100" dirty="0"/>
-              <a:t>Train score:</a:t>
+              <a:t>Train Score: 72.55%</a:t>
             </a:r>
           </a:p>
           <a:p>
             <a:pPr lvl="1"/>
             <a:r>
               <a:rPr lang="en-CA" sz="2100" dirty="0"/>
-              <a:t>Test score:</a:t>
+              <a:t>Test Score: 72.47%</a:t>
             </a:r>
           </a:p>
           <a:p>
             <a:pPr lvl="1"/>
+            <a:endParaRPr lang="en-CA" sz="2100" b="1" dirty="0"/>
+          </a:p>
+          <a:p>
+            <a:r>
+              <a:rPr lang="en-CA" sz="2400" dirty="0"/>
+              <a:t>Random Forest</a:t>
+            </a:r>
+          </a:p>
+          <a:p>
+            <a:pPr lvl="1"/>
+            <a:r>
+              <a:rPr lang="en-CA" sz="2100" dirty="0"/>
+              <a:t>Train Score: 79.56%</a:t>
+            </a:r>
+          </a:p>
+          <a:p>
+            <a:pPr lvl="1"/>
+            <a:r>
+              <a:rPr lang="en-CA" sz="2100" dirty="0"/>
+              <a:t>Test Score: 77.56%</a:t>
+            </a:r>
+          </a:p>
+          <a:p>
+            <a:pPr marL="228600" lvl="1" indent="0">
+              <a:buNone/>
+            </a:pPr>
+            <a:endParaRPr lang="en-CA" sz="2100" dirty="0"/>
+          </a:p>
+          <a:p>
+            <a:pPr marL="228600" lvl="1" indent="0">
+              <a:buNone/>
+            </a:pPr>
             <a:endParaRPr lang="en-CA" sz="2100" dirty="0"/>
           </a:p>
         </p:txBody>
@@ -6811,7 +7148,7 @@
           <a:lstStyle/>
           <a:p>
             <a:r>
-              <a:rPr lang="en-CA" dirty="0"/>
+              <a:rPr lang="en-CA" b="1" dirty="0"/>
               <a:t>introduction</a:t>
             </a:r>
           </a:p>
@@ -6869,7 +7206,7 @@
           <a:lstStyle/>
           <a:p>
             <a:r>
-              <a:rPr lang="en-CA" dirty="0"/>
+              <a:rPr lang="en-CA" b="1" dirty="0"/>
               <a:t>About the data</a:t>
             </a:r>
           </a:p>
@@ -7010,7 +7347,7 @@
           <a:lstStyle/>
           <a:p>
             <a:r>
-              <a:rPr lang="en-CA" dirty="0"/>
+              <a:rPr lang="en-CA" b="1" dirty="0"/>
               <a:t>Project goal</a:t>
             </a:r>
           </a:p>
@@ -7065,10 +7402,10 @@
       </p:sp>
       <p:pic>
         <p:nvPicPr>
-          <p:cNvPr id="2050" name="Picture 2" descr="Duplicate Content: What it is and how to avoid it - Seobility Wiki">
+          <p:cNvPr id="4" name="Picture 2" descr="How to Set Your Project Goals? 5 Steps to Remember">
             <a:extLst>
               <a:ext uri="{FF2B5EF4-FFF2-40B4-BE49-F238E27FC236}">
-                <a16:creationId xmlns:a16="http://schemas.microsoft.com/office/drawing/2014/main" id="{8456D573-91CA-0C6F-0D17-1F3A77491C8E}"/>
+                <a16:creationId xmlns:a16="http://schemas.microsoft.com/office/drawing/2014/main" id="{891090DE-2C3C-83E5-52DD-01FB8DE6CF48}"/>
               </a:ext>
             </a:extLst>
           </p:cNvPr>
@@ -7077,7 +7414,7 @@
           </p:cNvPicPr>
           <p:nvPr/>
         </p:nvPicPr>
-        <p:blipFill>
+        <p:blipFill rotWithShape="1">
           <a:blip r:embed="rId3">
             <a:extLst>
               <a:ext uri="{28A0092B-C50C-407E-A947-70E740481C1C}">
@@ -7085,15 +7422,13 @@
               </a:ext>
             </a:extLst>
           </a:blip>
-          <a:srcRect/>
-          <a:stretch>
-            <a:fillRect/>
-          </a:stretch>
+          <a:srcRect l="17800" r="23558"/>
+          <a:stretch/>
         </p:blipFill>
         <p:spPr bwMode="auto">
           <a:xfrm>
-            <a:off x="1231382" y="3588183"/>
-            <a:ext cx="3595141" cy="2823264"/>
+            <a:off x="1600040" y="3604651"/>
+            <a:ext cx="2887579" cy="2498785"/>
           </a:xfrm>
           <a:prstGeom prst="rect">
             <a:avLst/>
@@ -7162,7 +7497,7 @@
           <a:lstStyle/>
           <a:p>
             <a:r>
-              <a:rPr lang="en-CA" dirty="0"/>
+              <a:rPr lang="en-CA" b="1" dirty="0"/>
               <a:t>Project workflow</a:t>
             </a:r>
           </a:p>
@@ -7227,7 +7562,7 @@
               <a:rPr lang="en-CA" dirty="0"/>
             </a:br>
             <a:r>
-              <a:rPr lang="en-CA" dirty="0"/>
+              <a:rPr lang="en-CA" b="1" dirty="0"/>
               <a:t>Data preprocessing</a:t>
             </a:r>
           </a:p>
@@ -7426,7 +7761,7 @@
               <a:rPr lang="en-CA" dirty="0"/>
             </a:br>
             <a:r>
-              <a:rPr lang="en-CA" dirty="0"/>
+              <a:rPr lang="en-CA" b="1" dirty="0"/>
               <a:t>exploratory data analysis</a:t>
             </a:r>
           </a:p>

</xml_diff>

<commit_message>
Adding slides and minor changes to notebook
</commit_message>
<xml_diff>
--- a/NLP Project Slides.pptx
+++ b/NLP Project Slides.pptx
@@ -139,7 +139,7 @@
   <pc:docChgLst>
     <pc:chgData name="Joshua Ho" userId="f21a5117-53dc-4271-a79b-0a4f548af6e1" providerId="ADAL" clId="{30F5B7B2-929C-4119-8584-3764F0694251}"/>
     <pc:docChg chg="undo custSel addSld delSld modSld sldOrd">
-      <pc:chgData name="Joshua Ho" userId="f21a5117-53dc-4271-a79b-0a4f548af6e1" providerId="ADAL" clId="{30F5B7B2-929C-4119-8584-3764F0694251}" dt="2023-01-03T18:04:06.794" v="4847" actId="113"/>
+      <pc:chgData name="Joshua Ho" userId="f21a5117-53dc-4271-a79b-0a4f548af6e1" providerId="ADAL" clId="{30F5B7B2-929C-4119-8584-3764F0694251}" dt="2023-01-03T21:26:02.937" v="6766" actId="20577"/>
       <pc:docMkLst>
         <pc:docMk/>
       </pc:docMkLst>
@@ -183,7 +183,7 @@
         </pc:picChg>
       </pc:sldChg>
       <pc:sldChg chg="addSp delSp modSp mod modClrScheme chgLayout">
-        <pc:chgData name="Joshua Ho" userId="f21a5117-53dc-4271-a79b-0a4f548af6e1" providerId="ADAL" clId="{30F5B7B2-929C-4119-8584-3764F0694251}" dt="2023-01-03T16:52:57.199" v="3808" actId="113"/>
+        <pc:chgData name="Joshua Ho" userId="f21a5117-53dc-4271-a79b-0a4f548af6e1" providerId="ADAL" clId="{30F5B7B2-929C-4119-8584-3764F0694251}" dt="2023-01-03T21:20:32.577" v="5494" actId="20577"/>
         <pc:sldMkLst>
           <pc:docMk/>
           <pc:sldMk cId="4017487795" sldId="258"/>
@@ -197,7 +197,7 @@
           </ac:spMkLst>
         </pc:spChg>
         <pc:spChg chg="mod ord">
-          <ac:chgData name="Joshua Ho" userId="f21a5117-53dc-4271-a79b-0a4f548af6e1" providerId="ADAL" clId="{30F5B7B2-929C-4119-8584-3764F0694251}" dt="2023-01-02T20:19:26.164" v="3543" actId="700"/>
+          <ac:chgData name="Joshua Ho" userId="f21a5117-53dc-4271-a79b-0a4f548af6e1" providerId="ADAL" clId="{30F5B7B2-929C-4119-8584-3764F0694251}" dt="2023-01-03T21:20:32.577" v="5494" actId="20577"/>
           <ac:spMkLst>
             <pc:docMk/>
             <pc:sldMk cId="4017487795" sldId="258"/>
@@ -245,7 +245,7 @@
         </pc:picChg>
       </pc:sldChg>
       <pc:sldChg chg="addSp modSp mod">
-        <pc:chgData name="Joshua Ho" userId="f21a5117-53dc-4271-a79b-0a4f548af6e1" providerId="ADAL" clId="{30F5B7B2-929C-4119-8584-3764F0694251}" dt="2023-01-03T16:52:48.550" v="3806" actId="113"/>
+        <pc:chgData name="Joshua Ho" userId="f21a5117-53dc-4271-a79b-0a4f548af6e1" providerId="ADAL" clId="{30F5B7B2-929C-4119-8584-3764F0694251}" dt="2023-01-03T21:16:29.744" v="5493" actId="1076"/>
         <pc:sldMkLst>
           <pc:docMk/>
           <pc:sldMk cId="2551494371" sldId="260"/>
@@ -259,7 +259,7 @@
           </ac:spMkLst>
         </pc:spChg>
         <pc:spChg chg="mod">
-          <ac:chgData name="Joshua Ho" userId="f21a5117-53dc-4271-a79b-0a4f548af6e1" providerId="ADAL" clId="{30F5B7B2-929C-4119-8584-3764F0694251}" dt="2023-01-02T18:29:21.181" v="428" actId="20577"/>
+          <ac:chgData name="Joshua Ho" userId="f21a5117-53dc-4271-a79b-0a4f548af6e1" providerId="ADAL" clId="{30F5B7B2-929C-4119-8584-3764F0694251}" dt="2023-01-03T21:01:16.441" v="5244" actId="20577"/>
           <ac:spMkLst>
             <pc:docMk/>
             <pc:sldMk cId="2551494371" sldId="260"/>
@@ -267,11 +267,19 @@
           </ac:spMkLst>
         </pc:spChg>
         <pc:picChg chg="add mod">
-          <ac:chgData name="Joshua Ho" userId="f21a5117-53dc-4271-a79b-0a4f548af6e1" providerId="ADAL" clId="{30F5B7B2-929C-4119-8584-3764F0694251}" dt="2023-01-02T20:15:53.266" v="3518" actId="1076"/>
+          <ac:chgData name="Joshua Ho" userId="f21a5117-53dc-4271-a79b-0a4f548af6e1" providerId="ADAL" clId="{30F5B7B2-929C-4119-8584-3764F0694251}" dt="2023-01-03T21:16:29.744" v="5493" actId="1076"/>
           <ac:picMkLst>
             <pc:docMk/>
             <pc:sldMk cId="2551494371" sldId="260"/>
             <ac:picMk id="4" creationId="{2BA7880D-CD11-3D3B-91AF-35176E4FC6A7}"/>
+          </ac:picMkLst>
+        </pc:picChg>
+        <pc:picChg chg="add mod">
+          <ac:chgData name="Joshua Ho" userId="f21a5117-53dc-4271-a79b-0a4f548af6e1" providerId="ADAL" clId="{30F5B7B2-929C-4119-8584-3764F0694251}" dt="2023-01-03T21:16:24.646" v="5490" actId="1076"/>
+          <ac:picMkLst>
+            <pc:docMk/>
+            <pc:sldMk cId="2551494371" sldId="260"/>
+            <ac:picMk id="6" creationId="{E7D2A0FC-3116-55FB-2999-B975D99F447F}"/>
           </ac:picMkLst>
         </pc:picChg>
       </pc:sldChg>
@@ -291,7 +299,7 @@
         </pc:spChg>
       </pc:sldChg>
       <pc:sldChg chg="addSp delSp modSp mod modClrScheme chgLayout modNotesTx">
-        <pc:chgData name="Joshua Ho" userId="f21a5117-53dc-4271-a79b-0a4f548af6e1" providerId="ADAL" clId="{30F5B7B2-929C-4119-8584-3764F0694251}" dt="2023-01-03T16:52:41.672" v="3804" actId="113"/>
+        <pc:chgData name="Joshua Ho" userId="f21a5117-53dc-4271-a79b-0a4f548af6e1" providerId="ADAL" clId="{30F5B7B2-929C-4119-8584-3764F0694251}" dt="2023-01-03T20:56:30.851" v="5215" actId="20577"/>
         <pc:sldMkLst>
           <pc:docMk/>
           <pc:sldMk cId="1864157926" sldId="262"/>
@@ -305,7 +313,7 @@
           </ac:spMkLst>
         </pc:spChg>
         <pc:spChg chg="mod ord">
-          <ac:chgData name="Joshua Ho" userId="f21a5117-53dc-4271-a79b-0a4f548af6e1" providerId="ADAL" clId="{30F5B7B2-929C-4119-8584-3764F0694251}" dt="2023-01-03T02:30:51.462" v="3650" actId="20577"/>
+          <ac:chgData name="Joshua Ho" userId="f21a5117-53dc-4271-a79b-0a4f548af6e1" providerId="ADAL" clId="{30F5B7B2-929C-4119-8584-3764F0694251}" dt="2023-01-03T20:56:30.851" v="5215" actId="20577"/>
           <ac:spMkLst>
             <pc:docMk/>
             <pc:sldMk cId="1864157926" sldId="262"/>
@@ -352,8 +360,8 @@
           </ac:spMkLst>
         </pc:spChg>
       </pc:sldChg>
-      <pc:sldChg chg="addSp delSp modSp mod modClrScheme chgLayout">
-        <pc:chgData name="Joshua Ho" userId="f21a5117-53dc-4271-a79b-0a4f548af6e1" providerId="ADAL" clId="{30F5B7B2-929C-4119-8584-3764F0694251}" dt="2023-01-02T18:59:16.746" v="2129" actId="732"/>
+      <pc:sldChg chg="addSp delSp modSp add del mod modClrScheme chgLayout modNotesTx">
+        <pc:chgData name="Joshua Ho" userId="f21a5117-53dc-4271-a79b-0a4f548af6e1" providerId="ADAL" clId="{30F5B7B2-929C-4119-8584-3764F0694251}" dt="2023-01-03T21:26:02.937" v="6766" actId="20577"/>
         <pc:sldMkLst>
           <pc:docMk/>
           <pc:sldMk cId="2235909779" sldId="265"/>
@@ -506,8 +514,15 @@
           </ac:spMkLst>
         </pc:spChg>
       </pc:sldChg>
-      <pc:sldChg chg="addSp delSp modSp add mod">
-        <pc:chgData name="Joshua Ho" userId="f21a5117-53dc-4271-a79b-0a4f548af6e1" providerId="ADAL" clId="{30F5B7B2-929C-4119-8584-3764F0694251}" dt="2023-01-02T19:13:17.510" v="2272" actId="1076"/>
+      <pc:sldChg chg="mod modShow">
+        <pc:chgData name="Joshua Ho" userId="f21a5117-53dc-4271-a79b-0a4f548af6e1" providerId="ADAL" clId="{30F5B7B2-929C-4119-8584-3764F0694251}" dt="2023-01-03T20:39:49.111" v="4849" actId="729"/>
+        <pc:sldMkLst>
+          <pc:docMk/>
+          <pc:sldMk cId="2677454365" sldId="273"/>
+        </pc:sldMkLst>
+      </pc:sldChg>
+      <pc:sldChg chg="addSp delSp modSp add mod modNotesTx">
+        <pc:chgData name="Joshua Ho" userId="f21a5117-53dc-4271-a79b-0a4f548af6e1" providerId="ADAL" clId="{30F5B7B2-929C-4119-8584-3764F0694251}" dt="2023-01-03T21:25:59.349" v="6763" actId="20577"/>
         <pc:sldMkLst>
           <pc:docMk/>
           <pc:sldMk cId="1950470629" sldId="274"/>
@@ -609,8 +624,8 @@
           </ac:picMkLst>
         </pc:picChg>
       </pc:sldChg>
-      <pc:sldChg chg="addSp delSp modSp add mod ord">
-        <pc:chgData name="Joshua Ho" userId="f21a5117-53dc-4271-a79b-0a4f548af6e1" providerId="ADAL" clId="{30F5B7B2-929C-4119-8584-3764F0694251}" dt="2023-01-03T16:53:17.071" v="3817" actId="20577"/>
+      <pc:sldChg chg="addSp delSp modSp add mod ord modNotesTx">
+        <pc:chgData name="Joshua Ho" userId="f21a5117-53dc-4271-a79b-0a4f548af6e1" providerId="ADAL" clId="{30F5B7B2-929C-4119-8584-3764F0694251}" dt="2023-01-03T21:25:55.998" v="6762" actId="20577"/>
         <pc:sldMkLst>
           <pc:docMk/>
           <pc:sldMk cId="1126637772" sldId="275"/>
@@ -696,7 +711,7 @@
         </pc:picChg>
       </pc:sldChg>
       <pc:sldChg chg="addSp delSp modSp new mod modClrScheme chgLayout">
-        <pc:chgData name="Joshua Ho" userId="f21a5117-53dc-4271-a79b-0a4f548af6e1" providerId="ADAL" clId="{30F5B7B2-929C-4119-8584-3764F0694251}" dt="2023-01-03T16:54:19.645" v="3859" actId="1076"/>
+        <pc:chgData name="Joshua Ho" userId="f21a5117-53dc-4271-a79b-0a4f548af6e1" providerId="ADAL" clId="{30F5B7B2-929C-4119-8584-3764F0694251}" dt="2023-01-03T21:16:11.979" v="5487" actId="20577"/>
         <pc:sldMkLst>
           <pc:docMk/>
           <pc:sldMk cId="177064512" sldId="276"/>
@@ -734,7 +749,7 @@
           </ac:spMkLst>
         </pc:spChg>
         <pc:spChg chg="add mod ord">
-          <ac:chgData name="Joshua Ho" userId="f21a5117-53dc-4271-a79b-0a4f548af6e1" providerId="ADAL" clId="{30F5B7B2-929C-4119-8584-3764F0694251}" dt="2023-01-03T02:31:34.649" v="3711" actId="404"/>
+          <ac:chgData name="Joshua Ho" userId="f21a5117-53dc-4271-a79b-0a4f548af6e1" providerId="ADAL" clId="{30F5B7B2-929C-4119-8584-3764F0694251}" dt="2023-01-03T21:16:11.979" v="5487" actId="20577"/>
           <ac:spMkLst>
             <pc:docMk/>
             <pc:sldMk cId="177064512" sldId="276"/>
@@ -742,7 +757,7 @@
           </ac:spMkLst>
         </pc:spChg>
         <pc:spChg chg="add mod">
-          <ac:chgData name="Joshua Ho" userId="f21a5117-53dc-4271-a79b-0a4f548af6e1" providerId="ADAL" clId="{30F5B7B2-929C-4119-8584-3764F0694251}" dt="2023-01-03T16:54:19.645" v="3859" actId="1076"/>
+          <ac:chgData name="Joshua Ho" userId="f21a5117-53dc-4271-a79b-0a4f548af6e1" providerId="ADAL" clId="{30F5B7B2-929C-4119-8584-3764F0694251}" dt="2023-01-03T20:50:04.600" v="5105" actId="1076"/>
           <ac:spMkLst>
             <pc:docMk/>
             <pc:sldMk cId="177064512" sldId="276"/>
@@ -766,13 +781,29 @@
           </ac:spMkLst>
         </pc:spChg>
         <pc:spChg chg="add mod">
-          <ac:chgData name="Joshua Ho" userId="f21a5117-53dc-4271-a79b-0a4f548af6e1" providerId="ADAL" clId="{30F5B7B2-929C-4119-8584-3764F0694251}" dt="2023-01-02T20:30:46.644" v="3635" actId="2711"/>
+          <ac:chgData name="Joshua Ho" userId="f21a5117-53dc-4271-a79b-0a4f548af6e1" providerId="ADAL" clId="{30F5B7B2-929C-4119-8584-3764F0694251}" dt="2023-01-03T20:50:04.600" v="5105" actId="1076"/>
           <ac:spMkLst>
             <pc:docMk/>
             <pc:sldMk cId="177064512" sldId="276"/>
             <ac:spMk id="8" creationId="{E2195932-FB27-8919-17D7-09D6EFE710D0}"/>
           </ac:spMkLst>
         </pc:spChg>
+        <pc:grpChg chg="add mod">
+          <ac:chgData name="Joshua Ho" userId="f21a5117-53dc-4271-a79b-0a4f548af6e1" providerId="ADAL" clId="{30F5B7B2-929C-4119-8584-3764F0694251}" dt="2023-01-03T20:50:04.600" v="5105" actId="1076"/>
+          <ac:grpSpMkLst>
+            <pc:docMk/>
+            <pc:sldMk cId="177064512" sldId="276"/>
+            <ac:grpSpMk id="7" creationId="{4C6658BE-AF94-5419-A6ED-145DEEFB159D}"/>
+          </ac:grpSpMkLst>
+        </pc:grpChg>
+        <pc:picChg chg="add mod">
+          <ac:chgData name="Joshua Ho" userId="f21a5117-53dc-4271-a79b-0a4f548af6e1" providerId="ADAL" clId="{30F5B7B2-929C-4119-8584-3764F0694251}" dt="2023-01-03T20:50:24.558" v="5114" actId="1076"/>
+          <ac:picMkLst>
+            <pc:docMk/>
+            <pc:sldMk cId="177064512" sldId="276"/>
+            <ac:picMk id="3" creationId="{C3243B5B-3014-1F9F-DC35-1A3AE043263B}"/>
+          </ac:picMkLst>
+        </pc:picChg>
         <pc:picChg chg="add del mod">
           <ac:chgData name="Joshua Ho" userId="f21a5117-53dc-4271-a79b-0a4f548af6e1" providerId="ADAL" clId="{30F5B7B2-929C-4119-8584-3764F0694251}" dt="2023-01-02T20:21:41.419" v="3561" actId="478"/>
           <ac:picMkLst>
@@ -814,7 +845,7 @@
           </ac:picMkLst>
         </pc:picChg>
         <pc:picChg chg="add mod">
-          <ac:chgData name="Joshua Ho" userId="f21a5117-53dc-4271-a79b-0a4f548af6e1" providerId="ADAL" clId="{30F5B7B2-929C-4119-8584-3764F0694251}" dt="2023-01-02T20:29:53.618" v="3618" actId="1076"/>
+          <ac:chgData name="Joshua Ho" userId="f21a5117-53dc-4271-a79b-0a4f548af6e1" providerId="ADAL" clId="{30F5B7B2-929C-4119-8584-3764F0694251}" dt="2023-01-03T20:50:04.600" v="5105" actId="1076"/>
           <ac:picMkLst>
             <pc:docMk/>
             <pc:sldMk cId="177064512" sldId="276"/>
@@ -830,7 +861,7 @@
         </pc:sldMkLst>
       </pc:sldChg>
       <pc:sldChg chg="addSp delSp modSp add mod modClrScheme chgLayout">
-        <pc:chgData name="Joshua Ho" userId="f21a5117-53dc-4271-a79b-0a4f548af6e1" providerId="ADAL" clId="{30F5B7B2-929C-4119-8584-3764F0694251}" dt="2023-01-03T16:58:18.442" v="4202" actId="20577"/>
+        <pc:chgData name="Joshua Ho" userId="f21a5117-53dc-4271-a79b-0a4f548af6e1" providerId="ADAL" clId="{30F5B7B2-929C-4119-8584-3764F0694251}" dt="2023-01-03T21:14:57.966" v="5436" actId="313"/>
         <pc:sldMkLst>
           <pc:docMk/>
           <pc:sldMk cId="1889622697" sldId="277"/>
@@ -852,13 +883,21 @@
           </ac:spMkLst>
         </pc:spChg>
         <pc:spChg chg="mod ord">
-          <ac:chgData name="Joshua Ho" userId="f21a5117-53dc-4271-a79b-0a4f548af6e1" providerId="ADAL" clId="{30F5B7B2-929C-4119-8584-3764F0694251}" dt="2023-01-03T16:58:18.442" v="4202" actId="20577"/>
+          <ac:chgData name="Joshua Ho" userId="f21a5117-53dc-4271-a79b-0a4f548af6e1" providerId="ADAL" clId="{30F5B7B2-929C-4119-8584-3764F0694251}" dt="2023-01-03T21:14:57.966" v="5436" actId="313"/>
           <ac:spMkLst>
             <pc:docMk/>
             <pc:sldMk cId="1889622697" sldId="277"/>
             <ac:spMk id="5" creationId="{931E37D0-D8D4-34FD-E23B-C9471B582C9B}"/>
           </ac:spMkLst>
         </pc:spChg>
+        <pc:picChg chg="add del mod">
+          <ac:chgData name="Joshua Ho" userId="f21a5117-53dc-4271-a79b-0a4f548af6e1" providerId="ADAL" clId="{30F5B7B2-929C-4119-8584-3764F0694251}" dt="2023-01-03T20:51:22.112" v="5120" actId="478"/>
+          <ac:picMkLst>
+            <pc:docMk/>
+            <pc:sldMk cId="1889622697" sldId="277"/>
+            <ac:picMk id="3" creationId="{36956106-A39A-5169-D4FD-0C847A1C6BAD}"/>
+          </ac:picMkLst>
+        </pc:picChg>
         <pc:picChg chg="add mod">
           <ac:chgData name="Joshua Ho" userId="f21a5117-53dc-4271-a79b-0a4f548af6e1" providerId="ADAL" clId="{30F5B7B2-929C-4119-8584-3764F0694251}" dt="2023-01-02T20:25:58.897" v="3605" actId="1076"/>
           <ac:picMkLst>
@@ -869,7 +908,7 @@
         </pc:picChg>
       </pc:sldChg>
       <pc:sldChg chg="addSp modSp add mod">
-        <pc:chgData name="Joshua Ho" userId="f21a5117-53dc-4271-a79b-0a4f548af6e1" providerId="ADAL" clId="{30F5B7B2-929C-4119-8584-3764F0694251}" dt="2023-01-03T18:02:27.107" v="4787" actId="1076"/>
+        <pc:chgData name="Joshua Ho" userId="f21a5117-53dc-4271-a79b-0a4f548af6e1" providerId="ADAL" clId="{30F5B7B2-929C-4119-8584-3764F0694251}" dt="2023-01-03T20:51:55.566" v="5126" actId="27636"/>
         <pc:sldMkLst>
           <pc:docMk/>
           <pc:sldMk cId="1699826605" sldId="278"/>
@@ -883,7 +922,7 @@
           </ac:spMkLst>
         </pc:spChg>
         <pc:spChg chg="mod">
-          <ac:chgData name="Joshua Ho" userId="f21a5117-53dc-4271-a79b-0a4f548af6e1" providerId="ADAL" clId="{30F5B7B2-929C-4119-8584-3764F0694251}" dt="2023-01-03T18:02:22.570" v="4786" actId="27636"/>
+          <ac:chgData name="Joshua Ho" userId="f21a5117-53dc-4271-a79b-0a4f548af6e1" providerId="ADAL" clId="{30F5B7B2-929C-4119-8584-3764F0694251}" dt="2023-01-03T20:51:55.566" v="5126" actId="27636"/>
           <ac:spMkLst>
             <pc:docMk/>
             <pc:sldMk cId="1699826605" sldId="278"/>
@@ -899,8 +938,8 @@
           </ac:picMkLst>
         </pc:picChg>
       </pc:sldChg>
-      <pc:sldChg chg="addSp delSp modSp add mod ord modClrScheme chgLayout">
-        <pc:chgData name="Joshua Ho" userId="f21a5117-53dc-4271-a79b-0a4f548af6e1" providerId="ADAL" clId="{30F5B7B2-929C-4119-8584-3764F0694251}" dt="2023-01-03T18:04:06.794" v="4847" actId="113"/>
+      <pc:sldChg chg="addSp delSp modSp add mod ord modClrScheme chgLayout modNotesTx">
+        <pc:chgData name="Joshua Ho" userId="f21a5117-53dc-4271-a79b-0a4f548af6e1" providerId="ADAL" clId="{30F5B7B2-929C-4119-8584-3764F0694251}" dt="2023-01-03T21:09:50.097" v="5435" actId="20577"/>
         <pc:sldMkLst>
           <pc:docMk/>
           <pc:sldMk cId="2899897877" sldId="279"/>
@@ -922,7 +961,7 @@
           </ac:spMkLst>
         </pc:spChg>
         <pc:spChg chg="mod ord">
-          <ac:chgData name="Joshua Ho" userId="f21a5117-53dc-4271-a79b-0a4f548af6e1" providerId="ADAL" clId="{30F5B7B2-929C-4119-8584-3764F0694251}" dt="2023-01-03T18:04:06.794" v="4847" actId="113"/>
+          <ac:chgData name="Joshua Ho" userId="f21a5117-53dc-4271-a79b-0a4f548af6e1" providerId="ADAL" clId="{30F5B7B2-929C-4119-8584-3764F0694251}" dt="2023-01-03T20:51:35.404" v="5121" actId="113"/>
           <ac:spMkLst>
             <pc:docMk/>
             <pc:sldMk cId="2899897877" sldId="279"/>
@@ -1660,6 +1699,174 @@
     <p:extLst>
       <p:ext uri="{BB962C8B-B14F-4D97-AF65-F5344CB8AC3E}">
         <p14:creationId xmlns:p14="http://schemas.microsoft.com/office/powerpoint/2010/main" val="1337968775"/>
+      </p:ext>
+    </p:extLst>
+  </p:cSld>
+  <p:clrMapOvr>
+    <a:masterClrMapping/>
+  </p:clrMapOvr>
+</p:notes>
+</file>
+
+<file path=ppt/notesSlides/notesSlide5.xml><?xml version="1.0" encoding="utf-8"?>
+<p:notes xmlns:a="http://schemas.openxmlformats.org/drawingml/2006/main" xmlns:r="http://schemas.openxmlformats.org/officeDocument/2006/relationships" xmlns:p="http://schemas.openxmlformats.org/presentationml/2006/main">
+  <p:cSld>
+    <p:spTree>
+      <p:nvGrpSpPr>
+        <p:cNvPr id="1" name=""/>
+        <p:cNvGrpSpPr/>
+        <p:nvPr/>
+      </p:nvGrpSpPr>
+      <p:grpSpPr>
+        <a:xfrm>
+          <a:off x="0" y="0"/>
+          <a:ext cx="0" cy="0"/>
+          <a:chOff x="0" y="0"/>
+          <a:chExt cx="0" cy="0"/>
+        </a:xfrm>
+      </p:grpSpPr>
+      <p:sp>
+        <p:nvSpPr>
+          <p:cNvPr id="2" name="Slide Image Placeholder 1"/>
+          <p:cNvSpPr>
+            <a:spLocks noGrp="1" noRot="1" noChangeAspect="1"/>
+          </p:cNvSpPr>
+          <p:nvPr>
+            <p:ph type="sldImg"/>
+          </p:nvPr>
+        </p:nvSpPr>
+        <p:spPr/>
+      </p:sp>
+      <p:sp>
+        <p:nvSpPr>
+          <p:cNvPr id="3" name="Notes Placeholder 2"/>
+          <p:cNvSpPr>
+            <a:spLocks noGrp="1"/>
+          </p:cNvSpPr>
+          <p:nvPr>
+            <p:ph type="body" idx="1"/>
+          </p:nvPr>
+        </p:nvSpPr>
+        <p:spPr/>
+        <p:txBody>
+          <a:bodyPr/>
+          <a:lstStyle/>
+          <a:p>
+            <a:endParaRPr lang="en-CA" dirty="0"/>
+          </a:p>
+        </p:txBody>
+      </p:sp>
+      <p:sp>
+        <p:nvSpPr>
+          <p:cNvPr id="4" name="Slide Number Placeholder 3"/>
+          <p:cNvSpPr>
+            <a:spLocks noGrp="1"/>
+          </p:cNvSpPr>
+          <p:nvPr>
+            <p:ph type="sldNum" sz="quarter" idx="5"/>
+          </p:nvPr>
+        </p:nvSpPr>
+        <p:spPr/>
+        <p:txBody>
+          <a:bodyPr/>
+          <a:lstStyle/>
+          <a:p>
+            <a:fld id="{C8E61FFC-AAC4-4D06-9467-9441D5D78A84}" type="slidenum">
+              <a:rPr lang="en-CA" smtClean="0"/>
+              <a:t>17</a:t>
+            </a:fld>
+            <a:endParaRPr lang="en-CA"/>
+          </a:p>
+        </p:txBody>
+      </p:sp>
+    </p:spTree>
+    <p:extLst>
+      <p:ext uri="{BB962C8B-B14F-4D97-AF65-F5344CB8AC3E}">
+        <p14:creationId xmlns:p14="http://schemas.microsoft.com/office/powerpoint/2010/main" val="2314180149"/>
+      </p:ext>
+    </p:extLst>
+  </p:cSld>
+  <p:clrMapOvr>
+    <a:masterClrMapping/>
+  </p:clrMapOvr>
+</p:notes>
+</file>
+
+<file path=ppt/notesSlides/notesSlide6.xml><?xml version="1.0" encoding="utf-8"?>
+<p:notes xmlns:a="http://schemas.openxmlformats.org/drawingml/2006/main" xmlns:r="http://schemas.openxmlformats.org/officeDocument/2006/relationships" xmlns:p="http://schemas.openxmlformats.org/presentationml/2006/main">
+  <p:cSld>
+    <p:spTree>
+      <p:nvGrpSpPr>
+        <p:cNvPr id="1" name=""/>
+        <p:cNvGrpSpPr/>
+        <p:nvPr/>
+      </p:nvGrpSpPr>
+      <p:grpSpPr>
+        <a:xfrm>
+          <a:off x="0" y="0"/>
+          <a:ext cx="0" cy="0"/>
+          <a:chOff x="0" y="0"/>
+          <a:chExt cx="0" cy="0"/>
+        </a:xfrm>
+      </p:grpSpPr>
+      <p:sp>
+        <p:nvSpPr>
+          <p:cNvPr id="2" name="Slide Image Placeholder 1"/>
+          <p:cNvSpPr>
+            <a:spLocks noGrp="1" noRot="1" noChangeAspect="1"/>
+          </p:cNvSpPr>
+          <p:nvPr>
+            <p:ph type="sldImg"/>
+          </p:nvPr>
+        </p:nvSpPr>
+        <p:spPr/>
+      </p:sp>
+      <p:sp>
+        <p:nvSpPr>
+          <p:cNvPr id="3" name="Notes Placeholder 2"/>
+          <p:cNvSpPr>
+            <a:spLocks noGrp="1"/>
+          </p:cNvSpPr>
+          <p:nvPr>
+            <p:ph type="body" idx="1"/>
+          </p:nvPr>
+        </p:nvSpPr>
+        <p:spPr/>
+        <p:txBody>
+          <a:bodyPr/>
+          <a:lstStyle/>
+          <a:p>
+            <a:endParaRPr lang="en-CA" dirty="0"/>
+          </a:p>
+        </p:txBody>
+      </p:sp>
+      <p:sp>
+        <p:nvSpPr>
+          <p:cNvPr id="4" name="Slide Number Placeholder 3"/>
+          <p:cNvSpPr>
+            <a:spLocks noGrp="1"/>
+          </p:cNvSpPr>
+          <p:nvPr>
+            <p:ph type="sldNum" sz="quarter" idx="5"/>
+          </p:nvPr>
+        </p:nvSpPr>
+        <p:spPr/>
+        <p:txBody>
+          <a:bodyPr/>
+          <a:lstStyle/>
+          <a:p>
+            <a:fld id="{C8E61FFC-AAC4-4D06-9467-9441D5D78A84}" type="slidenum">
+              <a:rPr lang="en-CA" smtClean="0"/>
+              <a:t>19</a:t>
+            </a:fld>
+            <a:endParaRPr lang="en-CA"/>
+          </a:p>
+        </p:txBody>
+      </p:sp>
+    </p:spTree>
+    <p:extLst>
+      <p:ext uri="{BB962C8B-B14F-4D97-AF65-F5344CB8AC3E}">
+        <p14:creationId xmlns:p14="http://schemas.microsoft.com/office/powerpoint/2010/main" val="476867535"/>
       </p:ext>
     </p:extLst>
   </p:cSld>
@@ -5971,148 +6178,193 @@
             <a:pPr lvl="1"/>
             <a:r>
               <a:rPr lang="en-CA" sz="2200" dirty="0"/>
-              <a:t>Used lemmatization with WordNet Lemmatizer (found more efficient than Snowball Stemmer)</a:t>
+              <a:t>Using lemmatization with WordNet Lemmatizer (found more efficient than stemming with Snowball Stemmer)</a:t>
             </a:r>
           </a:p>
           <a:p>
             <a:r>
               <a:rPr lang="en-CA" sz="2400" dirty="0"/>
-              <a:t>Remove duplicate words</a:t>
-            </a:r>
-          </a:p>
-          <a:p>
-            <a:r>
-              <a:rPr lang="en-CA" sz="2400" dirty="0"/>
-              <a:t>Turn lists into strings</a:t>
-            </a:r>
-          </a:p>
-        </p:txBody>
-      </p:sp>
+              <a:t>Removing duplicate words</a:t>
+            </a:r>
+          </a:p>
+        </p:txBody>
+      </p:sp>
+      <p:grpSp>
+        <p:nvGrpSpPr>
+          <p:cNvPr id="7" name="Group 6">
+            <a:extLst>
+              <a:ext uri="{FF2B5EF4-FFF2-40B4-BE49-F238E27FC236}">
+                <a16:creationId xmlns:a16="http://schemas.microsoft.com/office/drawing/2014/main" id="{4C6658BE-AF94-5419-A6ED-145DEEFB159D}"/>
+              </a:ext>
+            </a:extLst>
+          </p:cNvPr>
+          <p:cNvGrpSpPr/>
+          <p:nvPr/>
+        </p:nvGrpSpPr>
+        <p:grpSpPr>
+          <a:xfrm>
+            <a:off x="2130456" y="3563332"/>
+            <a:ext cx="1461155" cy="2268498"/>
+            <a:chOff x="1985120" y="3671077"/>
+            <a:chExt cx="2068406" cy="2980885"/>
+          </a:xfrm>
+        </p:grpSpPr>
+        <p:pic>
+          <p:nvPicPr>
+            <p:cNvPr id="6156" name="Picture 12" descr="Python Logo transparent PNG - StickPNG">
+              <a:extLst>
+                <a:ext uri="{FF2B5EF4-FFF2-40B4-BE49-F238E27FC236}">
+                  <a16:creationId xmlns:a16="http://schemas.microsoft.com/office/drawing/2014/main" id="{371D196B-283B-AAFC-2BE9-9608A1F53DAA}"/>
+                </a:ext>
+              </a:extLst>
+            </p:cNvPr>
+            <p:cNvPicPr>
+              <a:picLocks noChangeAspect="1" noChangeArrowheads="1"/>
+            </p:cNvPicPr>
+            <p:nvPr/>
+          </p:nvPicPr>
+          <p:blipFill>
+            <a:blip r:embed="rId2">
+              <a:extLst>
+                <a:ext uri="{28A0092B-C50C-407E-A947-70E740481C1C}">
+                  <a14:useLocalDpi xmlns:a14="http://schemas.microsoft.com/office/drawing/2010/main" val="0"/>
+                </a:ext>
+              </a:extLst>
+            </a:blip>
+            <a:srcRect/>
+            <a:stretch>
+              <a:fillRect/>
+            </a:stretch>
+          </p:blipFill>
+          <p:spPr bwMode="auto">
+            <a:xfrm>
+              <a:off x="1985120" y="3671077"/>
+              <a:ext cx="2068406" cy="2060358"/>
+            </a:xfrm>
+            <a:prstGeom prst="rect">
+              <a:avLst/>
+            </a:prstGeom>
+            <a:noFill/>
+            <a:extLst>
+              <a:ext uri="{909E8E84-426E-40DD-AFC4-6F175D3DCCD1}">
+                <a14:hiddenFill xmlns:a14="http://schemas.microsoft.com/office/drawing/2010/main">
+                  <a:solidFill>
+                    <a:srgbClr val="FFFFFF"/>
+                  </a:solidFill>
+                </a14:hiddenFill>
+              </a:ext>
+            </a:extLst>
+          </p:spPr>
+        </p:pic>
+        <p:sp>
+          <p:nvSpPr>
+            <p:cNvPr id="8" name="TextBox 7">
+              <a:extLst>
+                <a:ext uri="{FF2B5EF4-FFF2-40B4-BE49-F238E27FC236}">
+                  <a16:creationId xmlns:a16="http://schemas.microsoft.com/office/drawing/2014/main" id="{E2195932-FB27-8919-17D7-09D6EFE710D0}"/>
+                </a:ext>
+              </a:extLst>
+            </p:cNvPr>
+            <p:cNvSpPr txBox="1"/>
+            <p:nvPr/>
+          </p:nvSpPr>
+          <p:spPr>
+            <a:xfrm>
+              <a:off x="2204301" y="5755577"/>
+              <a:ext cx="1687398" cy="523220"/>
+            </a:xfrm>
+            <a:prstGeom prst="rect">
+              <a:avLst/>
+            </a:prstGeom>
+            <a:noFill/>
+          </p:spPr>
+          <p:txBody>
+            <a:bodyPr wrap="square" rtlCol="0">
+              <a:spAutoFit/>
+            </a:bodyPr>
+            <a:lstStyle/>
+            <a:p>
+              <a:pPr algn="ctr"/>
+              <a:r>
+                <a:rPr lang="en-CA" sz="2800" b="1" dirty="0">
+                  <a:latin typeface="Arial" panose="020B0604020202020204" pitchFamily="34" charset="0"/>
+                  <a:cs typeface="Arial" panose="020B0604020202020204" pitchFamily="34" charset="0"/>
+                </a:rPr>
+                <a:t>NLTK</a:t>
+              </a:r>
+            </a:p>
+          </p:txBody>
+        </p:sp>
+        <p:sp>
+          <p:nvSpPr>
+            <p:cNvPr id="6" name="TextBox 5">
+              <a:extLst>
+                <a:ext uri="{FF2B5EF4-FFF2-40B4-BE49-F238E27FC236}">
+                  <a16:creationId xmlns:a16="http://schemas.microsoft.com/office/drawing/2014/main" id="{192E736B-4564-C6E8-E43E-0A615EB3B64D}"/>
+                </a:ext>
+              </a:extLst>
+            </p:cNvPr>
+            <p:cNvSpPr txBox="1"/>
+            <p:nvPr/>
+          </p:nvSpPr>
+          <p:spPr>
+            <a:xfrm>
+              <a:off x="2204301" y="6128742"/>
+              <a:ext cx="1687398" cy="523220"/>
+            </a:xfrm>
+            <a:prstGeom prst="rect">
+              <a:avLst/>
+            </a:prstGeom>
+            <a:noFill/>
+          </p:spPr>
+          <p:txBody>
+            <a:bodyPr wrap="square" rtlCol="0">
+              <a:spAutoFit/>
+            </a:bodyPr>
+            <a:lstStyle/>
+            <a:p>
+              <a:pPr algn="ctr"/>
+              <a:r>
+                <a:rPr lang="en-CA" sz="2800" b="1" dirty="0">
+                  <a:latin typeface="Arial" panose="020B0604020202020204" pitchFamily="34" charset="0"/>
+                  <a:cs typeface="Arial" panose="020B0604020202020204" pitchFamily="34" charset="0"/>
+                </a:rPr>
+                <a:t>RE</a:t>
+              </a:r>
+            </a:p>
+          </p:txBody>
+        </p:sp>
+      </p:grpSp>
       <p:pic>
         <p:nvPicPr>
-          <p:cNvPr id="6156" name="Picture 12" descr="Python Logo transparent PNG - StickPNG">
+          <p:cNvPr id="3" name="Picture 2">
             <a:extLst>
               <a:ext uri="{FF2B5EF4-FFF2-40B4-BE49-F238E27FC236}">
-                <a16:creationId xmlns:a16="http://schemas.microsoft.com/office/drawing/2014/main" id="{371D196B-283B-AAFC-2BE9-9608A1F53DAA}"/>
+                <a16:creationId xmlns:a16="http://schemas.microsoft.com/office/drawing/2014/main" id="{C3243B5B-3014-1F9F-DC35-1A3AE043263B}"/>
               </a:ext>
             </a:extLst>
           </p:cNvPr>
           <p:cNvPicPr>
-            <a:picLocks noChangeAspect="1" noChangeArrowheads="1"/>
+            <a:picLocks noChangeAspect="1"/>
           </p:cNvPicPr>
           <p:nvPr/>
         </p:nvPicPr>
         <p:blipFill>
-          <a:blip r:embed="rId2">
-            <a:extLst>
-              <a:ext uri="{28A0092B-C50C-407E-A947-70E740481C1C}">
-                <a14:useLocalDpi xmlns:a14="http://schemas.microsoft.com/office/drawing/2010/main" val="0"/>
-              </a:ext>
-            </a:extLst>
-          </a:blip>
-          <a:srcRect/>
+          <a:blip r:embed="rId3"/>
           <a:stretch>
             <a:fillRect/>
           </a:stretch>
         </p:blipFill>
-        <p:spPr bwMode="auto">
+        <p:spPr>
           <a:xfrm>
-            <a:off x="1985120" y="3671077"/>
-            <a:ext cx="2068406" cy="2060358"/>
+            <a:off x="4709160" y="5015860"/>
+            <a:ext cx="7482840" cy="1837652"/>
           </a:xfrm>
           <a:prstGeom prst="rect">
             <a:avLst/>
           </a:prstGeom>
-          <a:noFill/>
-          <a:extLst>
-            <a:ext uri="{909E8E84-426E-40DD-AFC4-6F175D3DCCD1}">
-              <a14:hiddenFill xmlns:a14="http://schemas.microsoft.com/office/drawing/2010/main">
-                <a:solidFill>
-                  <a:srgbClr val="FFFFFF"/>
-                </a:solidFill>
-              </a14:hiddenFill>
-            </a:ext>
-          </a:extLst>
         </p:spPr>
       </p:pic>
-      <p:sp>
-        <p:nvSpPr>
-          <p:cNvPr id="8" name="TextBox 7">
-            <a:extLst>
-              <a:ext uri="{FF2B5EF4-FFF2-40B4-BE49-F238E27FC236}">
-                <a16:creationId xmlns:a16="http://schemas.microsoft.com/office/drawing/2014/main" id="{E2195932-FB27-8919-17D7-09D6EFE710D0}"/>
-              </a:ext>
-            </a:extLst>
-          </p:cNvPr>
-          <p:cNvSpPr txBox="1"/>
-          <p:nvPr/>
-        </p:nvSpPr>
-        <p:spPr>
-          <a:xfrm>
-            <a:off x="2204301" y="5755577"/>
-            <a:ext cx="1687398" cy="523220"/>
-          </a:xfrm>
-          <a:prstGeom prst="rect">
-            <a:avLst/>
-          </a:prstGeom>
-          <a:noFill/>
-        </p:spPr>
-        <p:txBody>
-          <a:bodyPr wrap="square" rtlCol="0">
-            <a:spAutoFit/>
-          </a:bodyPr>
-          <a:lstStyle/>
-          <a:p>
-            <a:pPr algn="ctr"/>
-            <a:r>
-              <a:rPr lang="en-CA" sz="2800" b="1" dirty="0">
-                <a:latin typeface="Arial" panose="020B0604020202020204" pitchFamily="34" charset="0"/>
-                <a:cs typeface="Arial" panose="020B0604020202020204" pitchFamily="34" charset="0"/>
-              </a:rPr>
-              <a:t>NLTK</a:t>
-            </a:r>
-          </a:p>
-        </p:txBody>
-      </p:sp>
-      <p:sp>
-        <p:nvSpPr>
-          <p:cNvPr id="6" name="TextBox 5">
-            <a:extLst>
-              <a:ext uri="{FF2B5EF4-FFF2-40B4-BE49-F238E27FC236}">
-                <a16:creationId xmlns:a16="http://schemas.microsoft.com/office/drawing/2014/main" id="{192E736B-4564-C6E8-E43E-0A615EB3B64D}"/>
-              </a:ext>
-            </a:extLst>
-          </p:cNvPr>
-          <p:cNvSpPr txBox="1"/>
-          <p:nvPr/>
-        </p:nvSpPr>
-        <p:spPr>
-          <a:xfrm>
-            <a:off x="2204301" y="6128742"/>
-            <a:ext cx="1687398" cy="523220"/>
-          </a:xfrm>
-          <a:prstGeom prst="rect">
-            <a:avLst/>
-          </a:prstGeom>
-          <a:noFill/>
-        </p:spPr>
-        <p:txBody>
-          <a:bodyPr wrap="square" rtlCol="0">
-            <a:spAutoFit/>
-          </a:bodyPr>
-          <a:lstStyle/>
-          <a:p>
-            <a:pPr algn="ctr"/>
-            <a:r>
-              <a:rPr lang="en-CA" sz="2800" b="1" dirty="0">
-                <a:latin typeface="Arial" panose="020B0604020202020204" pitchFamily="34" charset="0"/>
-                <a:cs typeface="Arial" panose="020B0604020202020204" pitchFamily="34" charset="0"/>
-              </a:rPr>
-              <a:t>RE</a:t>
-            </a:r>
-          </a:p>
-        </p:txBody>
-      </p:sp>
     </p:spTree>
     <p:extLst>
       <p:ext uri="{BB962C8B-B14F-4D97-AF65-F5344CB8AC3E}">
@@ -6254,7 +6506,12 @@
             <p:ph idx="1"/>
           </p:nvPr>
         </p:nvSpPr>
-        <p:spPr/>
+        <p:spPr>
+          <a:xfrm>
+            <a:off x="6811494" y="361612"/>
+            <a:ext cx="4815840" cy="5248656"/>
+          </a:xfrm>
+        </p:spPr>
         <p:txBody>
           <a:bodyPr>
             <a:normAutofit/>
@@ -6263,7 +6520,13 @@
           <a:p>
             <a:r>
               <a:rPr lang="en-CA" sz="2400" dirty="0"/>
-              <a:t>Number of same words between each pair of questions</a:t>
+              <a:t>Character count for each question</a:t>
+            </a:r>
+          </a:p>
+          <a:p>
+            <a:r>
+              <a:rPr lang="en-CA" sz="2400" dirty="0"/>
+              <a:t>Word count for each question</a:t>
             </a:r>
           </a:p>
           <a:p>
@@ -6275,19 +6538,13 @@
           <a:p>
             <a:r>
               <a:rPr lang="en-CA" sz="2400" dirty="0"/>
-              <a:t>Character count for each question</a:t>
+              <a:t>Number of same words between each pair of questions</a:t>
             </a:r>
           </a:p>
           <a:p>
             <a:r>
               <a:rPr lang="en-CA" sz="2400" dirty="0"/>
-              <a:t>Word count for each question</a:t>
-            </a:r>
-          </a:p>
-          <a:p>
-            <a:r>
-              <a:rPr lang="en-CA" sz="2400" dirty="0"/>
-              <a:t>Cosine similarity for each pair of questions, derived from arrays created using TF-IDF</a:t>
+              <a:t>Cosine similarity for each pair of questions, derived from text vectorization (TF-IDF vectorizer)</a:t>
             </a:r>
           </a:p>
           <a:p>
@@ -6541,7 +6798,7 @@
             <a:pPr lvl="1"/>
             <a:r>
               <a:rPr lang="en-CA" sz="2200" dirty="0"/>
-              <a:t>Naïve Bayes</a:t>
+              <a:t>Multinomial Naïve Bayes</a:t>
             </a:r>
           </a:p>
           <a:p>
@@ -6561,7 +6818,7 @@
             <a:pPr lvl="1"/>
             <a:r>
               <a:rPr lang="en-CA" sz="2200" dirty="0"/>
-              <a:t>K-Folds Cross-Validation (7 Splits)</a:t>
+              <a:t>K-Folds Cross-Validation </a:t>
             </a:r>
           </a:p>
           <a:p>
@@ -6591,7 +6848,7 @@
           <p:nvPr/>
         </p:nvPicPr>
         <p:blipFill>
-          <a:blip r:embed="rId2">
+          <a:blip r:embed="rId3">
             <a:extLst>
               <a:ext uri="{28A0092B-C50C-407E-A947-70E740481C1C}">
                 <a14:useLocalDpi xmlns:a14="http://schemas.microsoft.com/office/drawing/2010/main" val="0"/>
@@ -6844,21 +7101,21 @@
           </a:p>
           <a:p>
             <a:r>
-              <a:rPr lang="en-CA" sz="2400" dirty="0"/>
+              <a:rPr lang="en-CA" sz="2400" b="1" dirty="0"/>
               <a:t>Random Forest</a:t>
             </a:r>
           </a:p>
           <a:p>
             <a:pPr lvl="1"/>
             <a:r>
-              <a:rPr lang="en-CA" sz="2100" dirty="0"/>
+              <a:rPr lang="en-CA" sz="2100" b="1" dirty="0"/>
               <a:t>Train Score: 79.56%</a:t>
             </a:r>
           </a:p>
           <a:p>
             <a:pPr lvl="1"/>
             <a:r>
-              <a:rPr lang="en-CA" sz="2100" dirty="0"/>
+              <a:rPr lang="en-CA" sz="2100" b="1" dirty="0"/>
               <a:t>Test Score: 77.56%</a:t>
             </a:r>
           </a:p>
@@ -7237,13 +7494,13 @@
           <a:p>
             <a:r>
               <a:rPr lang="en-CA" sz="2400" dirty="0"/>
-              <a:t>CSV file with over 400000 rows of data from Quora, a popular platform for asking questions</a:t>
+              <a:t>Unclean CSV file with over 400000 rows of data from Quora, a popular online forum for asking questions</a:t>
             </a:r>
           </a:p>
           <a:p>
             <a:r>
               <a:rPr lang="en-CA" sz="2400" dirty="0"/>
-              <a:t>Each row contains a pair of questions asked, with a column stating whether they are duplicate questions or not</a:t>
+              <a:t>Each row contains a pair of questions, with a column stating whether they are duplicate questions or not (the data is labeled, and has a clear target variable)</a:t>
             </a:r>
           </a:p>
         </p:txBody>
@@ -7276,9 +7533,9 @@
           </a:stretch>
         </p:blipFill>
         <p:spPr bwMode="auto">
-          <a:xfrm>
-            <a:off x="4342178" y="4666269"/>
-            <a:ext cx="3507644" cy="1838906"/>
+          <a:xfrm rot="20207404">
+            <a:off x="375451" y="5167271"/>
+            <a:ext cx="2185019" cy="1145511"/>
           </a:xfrm>
           <a:prstGeom prst="rect">
             <a:avLst/>
@@ -7293,6 +7550,36 @@
               </a14:hiddenFill>
             </a:ext>
           </a:extLst>
+        </p:spPr>
+      </p:pic>
+      <p:pic>
+        <p:nvPicPr>
+          <p:cNvPr id="6" name="Picture 5">
+            <a:extLst>
+              <a:ext uri="{FF2B5EF4-FFF2-40B4-BE49-F238E27FC236}">
+                <a16:creationId xmlns:a16="http://schemas.microsoft.com/office/drawing/2014/main" id="{E7D2A0FC-3116-55FB-2999-B975D99F447F}"/>
+              </a:ext>
+            </a:extLst>
+          </p:cNvPr>
+          <p:cNvPicPr>
+            <a:picLocks noChangeAspect="1"/>
+          </p:cNvPicPr>
+          <p:nvPr/>
+        </p:nvPicPr>
+        <p:blipFill>
+          <a:blip r:embed="rId3"/>
+          <a:stretch>
+            <a:fillRect/>
+          </a:stretch>
+        </p:blipFill>
+        <p:spPr>
+          <a:xfrm>
+            <a:off x="2852354" y="4822996"/>
+            <a:ext cx="6487291" cy="1834061"/>
+          </a:xfrm>
+          <a:prstGeom prst="rect">
+            <a:avLst/>
+          </a:prstGeom>
         </p:spPr>
       </p:pic>
     </p:spTree>
@@ -7383,19 +7670,19 @@
           <a:p>
             <a:r>
               <a:rPr lang="en-CA" sz="2400" dirty="0"/>
-              <a:t>Users on Quora commonly ask duplicate or very similar question</a:t>
+              <a:t>Users on Quora frequently ask duplicate or very similar questions</a:t>
             </a:r>
           </a:p>
           <a:p>
             <a:r>
               <a:rPr lang="en-CA" sz="2400" dirty="0"/>
-              <a:t>Design a model that can determine whether a question is a duplicate or not</a:t>
+              <a:t>Design a model that can determine whether a question that is asked is a duplicate or not</a:t>
             </a:r>
           </a:p>
           <a:p>
             <a:r>
               <a:rPr lang="en-CA" sz="2400" dirty="0"/>
-              <a:t>Output an already posted answer if the question is a duplicate, instead of someone re-answering the question</a:t>
+              <a:t>By knowing if a question is a duplicate, we can use a previous answer instead of having somebody re-answer the question from scratch</a:t>
             </a:r>
           </a:p>
         </p:txBody>
@@ -7634,7 +7921,7 @@
             <a:pPr lvl="1"/>
             <a:r>
               <a:rPr lang="en-CA" sz="2000" dirty="0"/>
-              <a:t>Changing all columns to string datatype</a:t>
+              <a:t>Changing all columns to string data type</a:t>
             </a:r>
           </a:p>
           <a:p>

</xml_diff>